<commit_message>
Mostly just adding checks for 'E's in the insurance and plan type flags to main qa program, but apparently there's some other stuff in here.
</commit_message>
<xml_diff>
--- a/reports/learning_data_system_hcsrn_2016_poster.pptx
+++ b/reports/learning_data_system_hcsrn_2016_poster.pptx
@@ -242,7 +242,7 @@
             <a:fld id="{ED08DE81-0E56-40CD-BF21-E80724925E1D}" type="datetime1">
               <a:rPr lang="en-US" altLang="en-US"/>
               <a:pPr/>
-              <a:t>3/9/2016</a:t>
+              <a:t>3/21/2016</a:t>
             </a:fld>
             <a:endParaRPr lang="en-US" altLang="en-US"/>
           </a:p>
@@ -437,7 +437,7 @@
             <a:fld id="{D20E2334-564C-49F4-AAAC-87199CFF6DF7}" type="datetime1">
               <a:rPr lang="en-US" altLang="en-US"/>
               <a:pPr/>
-              <a:t>3/9/2016</a:t>
+              <a:t>3/21/2016</a:t>
             </a:fld>
             <a:endParaRPr lang="en-US" altLang="en-US"/>
           </a:p>
@@ -1587,7 +1587,11 @@
           </a:lstStyle>
           <a:p>
             <a:pPr eaLnBrk="1" hangingPunct="1"/>
-            <a:endParaRPr lang="en-US" altLang="en-US"/>
+            <a:endParaRPr lang="en-US" altLang="en-US">
+              <a:latin typeface="Tahoma" panose="020B0604030504040204" pitchFamily="34" charset="0"/>
+              <a:ea typeface="Tahoma" panose="020B0604030504040204" pitchFamily="34" charset="0"/>
+              <a:cs typeface="Tahoma" panose="020B0604030504040204" pitchFamily="34" charset="0"/>
+            </a:endParaRPr>
           </a:p>
         </p:txBody>
       </p:sp>
@@ -1654,9 +1658,9 @@
         <p:grpSpPr>
           <a:xfrm>
             <a:off x="609362" y="762000"/>
-            <a:ext cx="26382663" cy="2667238"/>
+            <a:ext cx="26687700" cy="2362200"/>
             <a:chOff x="914400" y="762000"/>
-            <a:chExt cx="26382663" cy="2667238"/>
+            <a:chExt cx="26382663" cy="2362200"/>
           </a:xfrm>
         </p:grpSpPr>
         <p:sp>
@@ -1805,7 +1809,11 @@
             </a:lstStyle>
             <a:p>
               <a:pPr eaLnBrk="1" hangingPunct="1"/>
-              <a:endParaRPr lang="en-US" altLang="en-US"/>
+              <a:endParaRPr lang="en-US" altLang="en-US">
+                <a:latin typeface="Tahoma" panose="020B0604030504040204" pitchFamily="34" charset="0"/>
+                <a:ea typeface="Tahoma" panose="020B0604030504040204" pitchFamily="34" charset="0"/>
+                <a:cs typeface="Tahoma" panose="020B0604030504040204" pitchFamily="34" charset="0"/>
+              </a:endParaRPr>
             </a:p>
           </p:txBody>
         </p:sp>
@@ -1819,8 +1827,8 @@
           </p:nvSpPr>
           <p:spPr bwMode="auto">
             <a:xfrm>
-              <a:off x="1295400" y="838200"/>
-              <a:ext cx="25603200" cy="976313"/>
+              <a:off x="1295399" y="838200"/>
+              <a:ext cx="24546896" cy="984885"/>
             </a:xfrm>
             <a:prstGeom prst="rect">
               <a:avLst/>
@@ -1850,7 +1858,7 @@
             </a:extLst>
           </p:spPr>
           <p:txBody>
-            <a:bodyPr>
+            <a:bodyPr wrap="square">
               <a:spAutoFit/>
             </a:bodyPr>
             <a:lstStyle>
@@ -1971,21 +1979,19 @@
                   <a:solidFill>
                     <a:schemeClr val="bg1"/>
                   </a:solidFill>
+                  <a:latin typeface="Tahoma" panose="020B0604030504040204" pitchFamily="34" charset="0"/>
+                  <a:ea typeface="Tahoma" panose="020B0604030504040204" pitchFamily="34" charset="0"/>
+                  <a:cs typeface="Tahoma" panose="020B0604030504040204" pitchFamily="34" charset="0"/>
                 </a:rPr>
-                <a:t>The Learning Healthcare (Data) System</a:t>
-              </a:r>
-              <a:r>
-                <a:rPr lang="en-US" altLang="en-US" sz="5800" dirty="0">
-                  <a:solidFill>
-                    <a:schemeClr val="bg1"/>
-                  </a:solidFill>
-                </a:rPr>
-                <a:t>: VDW Data Capture Revisited</a:t>
+                <a:t>Are You Getting The Whole Story? VDW Completeness Re(capture)d</a:t>
               </a:r>
               <a:endParaRPr lang="en-US" altLang="en-US" sz="5800" dirty="0">
                 <a:solidFill>
                   <a:schemeClr val="bg1"/>
                 </a:solidFill>
+                <a:latin typeface="Tahoma" panose="020B0604030504040204" pitchFamily="34" charset="0"/>
+                <a:ea typeface="Tahoma" panose="020B0604030504040204" pitchFamily="34" charset="0"/>
+                <a:cs typeface="Tahoma" panose="020B0604030504040204" pitchFamily="34" charset="0"/>
               </a:endParaRPr>
             </a:p>
           </p:txBody>
@@ -2000,8 +2006,8 @@
           </p:nvSpPr>
           <p:spPr bwMode="auto">
             <a:xfrm>
-              <a:off x="1392238" y="1828800"/>
-              <a:ext cx="25506362" cy="1600438"/>
+              <a:off x="1392238" y="2094637"/>
+              <a:ext cx="25506362" cy="877163"/>
             </a:xfrm>
             <a:prstGeom prst="rect">
               <a:avLst/>
@@ -2148,281 +2154,364 @@
                 </a:spcBef>
               </a:pPr>
               <a:r>
-                <a:rPr lang="en-US" altLang="en-US" dirty="0" smtClean="0">
+                <a:rPr lang="en-US" altLang="en-US" sz="1800" dirty="0" smtClean="0">
                   <a:solidFill>
                     <a:schemeClr val="bg1"/>
                   </a:solidFill>
+                  <a:latin typeface="Tahoma" panose="020B0604030504040204" pitchFamily="34" charset="0"/>
+                  <a:ea typeface="Tahoma" panose="020B0604030504040204" pitchFamily="34" charset="0"/>
+                  <a:cs typeface="Tahoma" panose="020B0604030504040204" pitchFamily="34" charset="0"/>
                 </a:rPr>
-                <a:t>Roy </a:t>
+                <a:t>Roy Pardee, JD MA</a:t>
               </a:r>
               <a:r>
-                <a:rPr lang="en-US" altLang="en-US" dirty="0" smtClean="0">
+                <a:rPr lang="en-US" altLang="en-US" sz="1800" baseline="30000" dirty="0" smtClean="0">
                   <a:solidFill>
                     <a:schemeClr val="bg1"/>
                   </a:solidFill>
-                </a:rPr>
-                <a:t>Pardee, JD </a:t>
-              </a:r>
-              <a:r>
-                <a:rPr lang="en-US" altLang="en-US" dirty="0" smtClean="0">
-                  <a:solidFill>
-                    <a:schemeClr val="bg1"/>
-                  </a:solidFill>
-                </a:rPr>
-                <a:t>MA</a:t>
-              </a:r>
-              <a:r>
-                <a:rPr lang="en-US" altLang="en-US" baseline="30000" dirty="0" smtClean="0">
-                  <a:solidFill>
-                    <a:schemeClr val="bg1"/>
-                  </a:solidFill>
+                  <a:latin typeface="Tahoma" panose="020B0604030504040204" pitchFamily="34" charset="0"/>
+                  <a:ea typeface="Tahoma" panose="020B0604030504040204" pitchFamily="34" charset="0"/>
+                  <a:cs typeface="Tahoma" panose="020B0604030504040204" pitchFamily="34" charset="0"/>
                 </a:rPr>
                 <a:t>1</a:t>
               </a:r>
               <a:r>
-                <a:rPr lang="en-US" altLang="en-US" dirty="0" smtClean="0">
+                <a:rPr lang="en-US" altLang="en-US" sz="1800" dirty="0" smtClean="0">
                   <a:solidFill>
                     <a:schemeClr val="bg1"/>
                   </a:solidFill>
+                  <a:latin typeface="Tahoma" panose="020B0604030504040204" pitchFamily="34" charset="0"/>
+                  <a:ea typeface="Tahoma" panose="020B0604030504040204" pitchFamily="34" charset="0"/>
+                  <a:cs typeface="Tahoma" panose="020B0604030504040204" pitchFamily="34" charset="0"/>
                 </a:rPr>
                 <a:t>; Don Bachman, MS</a:t>
               </a:r>
               <a:r>
-                <a:rPr lang="en-US" altLang="en-US" baseline="30000" dirty="0" smtClean="0">
+                <a:rPr lang="en-US" altLang="en-US" sz="1800" baseline="30000" dirty="0" smtClean="0">
                   <a:solidFill>
                     <a:schemeClr val="bg1"/>
                   </a:solidFill>
+                  <a:latin typeface="Tahoma" panose="020B0604030504040204" pitchFamily="34" charset="0"/>
+                  <a:ea typeface="Tahoma" panose="020B0604030504040204" pitchFamily="34" charset="0"/>
+                  <a:cs typeface="Tahoma" panose="020B0604030504040204" pitchFamily="34" charset="0"/>
                 </a:rPr>
                 <a:t>2</a:t>
               </a:r>
               <a:r>
-                <a:rPr lang="en-US" altLang="en-US" dirty="0" smtClean="0">
+                <a:rPr lang="en-US" altLang="en-US" sz="1800" dirty="0" smtClean="0">
                   <a:solidFill>
                     <a:schemeClr val="bg1"/>
                   </a:solidFill>
+                  <a:latin typeface="Tahoma" panose="020B0604030504040204" pitchFamily="34" charset="0"/>
+                  <a:ea typeface="Tahoma" panose="020B0604030504040204" pitchFamily="34" charset="0"/>
+                  <a:cs typeface="Tahoma" panose="020B0604030504040204" pitchFamily="34" charset="0"/>
                 </a:rPr>
                 <a:t>; Mark </a:t>
               </a:r>
               <a:r>
-                <a:rPr lang="en-US" altLang="en-US" dirty="0" err="1" smtClean="0">
+                <a:rPr lang="en-US" altLang="en-US" sz="1800" dirty="0" err="1" smtClean="0">
                   <a:solidFill>
                     <a:schemeClr val="bg1"/>
                   </a:solidFill>
+                  <a:latin typeface="Tahoma" panose="020B0604030504040204" pitchFamily="34" charset="0"/>
+                  <a:ea typeface="Tahoma" panose="020B0604030504040204" pitchFamily="34" charset="0"/>
+                  <a:cs typeface="Tahoma" panose="020B0604030504040204" pitchFamily="34" charset="0"/>
                 </a:rPr>
                 <a:t>Hornbrook</a:t>
               </a:r>
               <a:r>
-                <a:rPr lang="en-US" altLang="en-US" dirty="0" smtClean="0">
+                <a:rPr lang="en-US" altLang="en-US" sz="1800" dirty="0" smtClean="0">
                   <a:solidFill>
                     <a:schemeClr val="bg1"/>
                   </a:solidFill>
+                  <a:latin typeface="Tahoma" panose="020B0604030504040204" pitchFamily="34" charset="0"/>
+                  <a:ea typeface="Tahoma" panose="020B0604030504040204" pitchFamily="34" charset="0"/>
+                  <a:cs typeface="Tahoma" panose="020B0604030504040204" pitchFamily="34" charset="0"/>
                 </a:rPr>
                 <a:t>, PhD</a:t>
               </a:r>
               <a:r>
-                <a:rPr lang="en-US" altLang="en-US" baseline="30000" dirty="0" smtClean="0">
+                <a:rPr lang="en-US" altLang="en-US" sz="1800" baseline="30000" dirty="0" smtClean="0">
                   <a:solidFill>
                     <a:schemeClr val="bg1"/>
                   </a:solidFill>
+                  <a:latin typeface="Tahoma" panose="020B0604030504040204" pitchFamily="34" charset="0"/>
+                  <a:ea typeface="Tahoma" panose="020B0604030504040204" pitchFamily="34" charset="0"/>
+                  <a:cs typeface="Tahoma" panose="020B0604030504040204" pitchFamily="34" charset="0"/>
                 </a:rPr>
                 <a:t>2</a:t>
               </a:r>
               <a:r>
-                <a:rPr lang="en-US" altLang="en-US" dirty="0" smtClean="0">
+                <a:rPr lang="en-US" altLang="en-US" sz="1800" dirty="0" smtClean="0">
                   <a:solidFill>
                     <a:schemeClr val="bg1"/>
                   </a:solidFill>
+                  <a:latin typeface="Tahoma" panose="020B0604030504040204" pitchFamily="34" charset="0"/>
+                  <a:ea typeface="Tahoma" panose="020B0604030504040204" pitchFamily="34" charset="0"/>
+                  <a:cs typeface="Tahoma" panose="020B0604030504040204" pitchFamily="34" charset="0"/>
                 </a:rPr>
                 <a:t>; Catherine Cleveland</a:t>
               </a:r>
               <a:r>
-                <a:rPr lang="en-US" altLang="en-US" baseline="30000" dirty="0" smtClean="0">
+                <a:rPr lang="en-US" altLang="en-US" sz="1800" baseline="30000" dirty="0" smtClean="0">
                   <a:solidFill>
                     <a:schemeClr val="bg1"/>
                   </a:solidFill>
+                  <a:latin typeface="Tahoma" panose="020B0604030504040204" pitchFamily="34" charset="0"/>
+                  <a:ea typeface="Tahoma" panose="020B0604030504040204" pitchFamily="34" charset="0"/>
+                  <a:cs typeface="Tahoma" panose="020B0604030504040204" pitchFamily="34" charset="0"/>
                 </a:rPr>
                 <a:t>2</a:t>
               </a:r>
               <a:r>
-                <a:rPr lang="en-US" altLang="en-US" dirty="0" smtClean="0">
+                <a:rPr lang="en-US" altLang="en-US" sz="1800" dirty="0" smtClean="0">
                   <a:solidFill>
                     <a:schemeClr val="bg1"/>
                   </a:solidFill>
+                  <a:latin typeface="Tahoma" panose="020B0604030504040204" pitchFamily="34" charset="0"/>
+                  <a:ea typeface="Tahoma" panose="020B0604030504040204" pitchFamily="34" charset="0"/>
+                  <a:cs typeface="Tahoma" panose="020B0604030504040204" pitchFamily="34" charset="0"/>
                 </a:rPr>
                 <a:t>; </a:t>
               </a:r>
               <a:r>
-                <a:rPr lang="en-US" altLang="en-US" dirty="0" err="1" smtClean="0">
+                <a:rPr lang="en-US" altLang="en-US" sz="1800" dirty="0" err="1" smtClean="0">
                   <a:solidFill>
                     <a:schemeClr val="bg1"/>
                   </a:solidFill>
+                  <a:latin typeface="Tahoma" panose="020B0604030504040204" pitchFamily="34" charset="0"/>
+                  <a:ea typeface="Tahoma" panose="020B0604030504040204" pitchFamily="34" charset="0"/>
+                  <a:cs typeface="Tahoma" panose="020B0604030504040204" pitchFamily="34" charset="0"/>
                 </a:rPr>
                 <a:t>Priyam</a:t>
               </a:r>
               <a:r>
-                <a:rPr lang="en-US" altLang="en-US" dirty="0" smtClean="0">
+                <a:rPr lang="en-US" altLang="en-US" sz="1800" dirty="0" smtClean="0">
                   <a:solidFill>
                     <a:schemeClr val="bg1"/>
                   </a:solidFill>
+                  <a:latin typeface="Tahoma" panose="020B0604030504040204" pitchFamily="34" charset="0"/>
+                  <a:ea typeface="Tahoma" panose="020B0604030504040204" pitchFamily="34" charset="0"/>
+                  <a:cs typeface="Tahoma" panose="020B0604030504040204" pitchFamily="34" charset="0"/>
                 </a:rPr>
                 <a:t> </a:t>
               </a:r>
               <a:r>
-                <a:rPr lang="en-US" altLang="en-US" dirty="0" err="1" smtClean="0">
+                <a:rPr lang="en-US" altLang="en-US" sz="1800" dirty="0" err="1" smtClean="0">
                   <a:solidFill>
                     <a:schemeClr val="bg1"/>
                   </a:solidFill>
+                  <a:latin typeface="Tahoma" panose="020B0604030504040204" pitchFamily="34" charset="0"/>
+                  <a:ea typeface="Tahoma" panose="020B0604030504040204" pitchFamily="34" charset="0"/>
+                  <a:cs typeface="Tahoma" panose="020B0604030504040204" pitchFamily="34" charset="0"/>
                 </a:rPr>
                 <a:t>Mathur</a:t>
               </a:r>
               <a:r>
-                <a:rPr lang="en-US" altLang="en-US" dirty="0" smtClean="0">
+                <a:rPr lang="en-US" altLang="en-US" sz="1800" dirty="0" smtClean="0">
                   <a:solidFill>
                     <a:schemeClr val="bg1"/>
                   </a:solidFill>
+                  <a:latin typeface="Tahoma" panose="020B0604030504040204" pitchFamily="34" charset="0"/>
+                  <a:ea typeface="Tahoma" panose="020B0604030504040204" pitchFamily="34" charset="0"/>
+                  <a:cs typeface="Tahoma" panose="020B0604030504040204" pitchFamily="34" charset="0"/>
                 </a:rPr>
                 <a:t>, MS</a:t>
               </a:r>
               <a:r>
-                <a:rPr lang="en-US" altLang="en-US" baseline="30000" dirty="0" smtClean="0">
+                <a:rPr lang="en-US" altLang="en-US" sz="1800" baseline="30000" dirty="0" smtClean="0">
                   <a:solidFill>
                     <a:schemeClr val="bg1"/>
                   </a:solidFill>
+                  <a:latin typeface="Tahoma" panose="020B0604030504040204" pitchFamily="34" charset="0"/>
+                  <a:ea typeface="Tahoma" panose="020B0604030504040204" pitchFamily="34" charset="0"/>
+                  <a:cs typeface="Tahoma" panose="020B0604030504040204" pitchFamily="34" charset="0"/>
                 </a:rPr>
                 <a:t>3</a:t>
               </a:r>
               <a:r>
-                <a:rPr lang="en-US" altLang="en-US" dirty="0" smtClean="0">
+                <a:rPr lang="en-US" altLang="en-US" sz="1800" dirty="0" smtClean="0">
                   <a:solidFill>
                     <a:schemeClr val="bg1"/>
                   </a:solidFill>
+                  <a:latin typeface="Tahoma" panose="020B0604030504040204" pitchFamily="34" charset="0"/>
+                  <a:ea typeface="Tahoma" panose="020B0604030504040204" pitchFamily="34" charset="0"/>
+                  <a:cs typeface="Tahoma" panose="020B0604030504040204" pitchFamily="34" charset="0"/>
                 </a:rPr>
                 <a:t>; Dan Ng, MBA</a:t>
               </a:r>
               <a:r>
-                <a:rPr lang="en-US" altLang="en-US" baseline="30000" dirty="0" smtClean="0">
+                <a:rPr lang="en-US" altLang="en-US" sz="1800" baseline="30000" dirty="0" smtClean="0">
                   <a:solidFill>
                     <a:schemeClr val="bg1"/>
                   </a:solidFill>
+                  <a:latin typeface="Tahoma" panose="020B0604030504040204" pitchFamily="34" charset="0"/>
+                  <a:ea typeface="Tahoma" panose="020B0604030504040204" pitchFamily="34" charset="0"/>
+                  <a:cs typeface="Tahoma" panose="020B0604030504040204" pitchFamily="34" charset="0"/>
                 </a:rPr>
                 <a:t>4</a:t>
               </a:r>
               <a:r>
-                <a:rPr lang="en-US" altLang="en-US" dirty="0" smtClean="0">
+                <a:rPr lang="en-US" altLang="en-US" sz="1800" dirty="0" smtClean="0">
                   <a:solidFill>
                     <a:schemeClr val="bg1"/>
                   </a:solidFill>
+                  <a:latin typeface="Tahoma" panose="020B0604030504040204" pitchFamily="34" charset="0"/>
+                  <a:ea typeface="Tahoma" panose="020B0604030504040204" pitchFamily="34" charset="0"/>
+                  <a:cs typeface="Tahoma" panose="020B0604030504040204" pitchFamily="34" charset="0"/>
                 </a:rPr>
                 <a:t>; Susan </a:t>
               </a:r>
               <a:r>
-                <a:rPr lang="en-US" altLang="en-US" dirty="0" err="1" smtClean="0">
+                <a:rPr lang="en-US" altLang="en-US" sz="1800" dirty="0" err="1" smtClean="0">
                   <a:solidFill>
                     <a:schemeClr val="bg1"/>
                   </a:solidFill>
+                  <a:latin typeface="Tahoma" panose="020B0604030504040204" pitchFamily="34" charset="0"/>
+                  <a:ea typeface="Tahoma" panose="020B0604030504040204" pitchFamily="34" charset="0"/>
+                  <a:cs typeface="Tahoma" panose="020B0604030504040204" pitchFamily="34" charset="0"/>
                 </a:rPr>
                 <a:t>Aumer</a:t>
               </a:r>
               <a:r>
-                <a:rPr lang="en-US" altLang="en-US" dirty="0" smtClean="0">
+                <a:rPr lang="en-US" altLang="en-US" sz="1800" dirty="0" smtClean="0">
                   <a:solidFill>
                     <a:schemeClr val="bg1"/>
                   </a:solidFill>
+                  <a:latin typeface="Tahoma" panose="020B0604030504040204" pitchFamily="34" charset="0"/>
+                  <a:ea typeface="Tahoma" panose="020B0604030504040204" pitchFamily="34" charset="0"/>
+                  <a:cs typeface="Tahoma" panose="020B0604030504040204" pitchFamily="34" charset="0"/>
                 </a:rPr>
                 <a:t>, PhD PMP</a:t>
               </a:r>
               <a:r>
-                <a:rPr lang="en-US" altLang="en-US" baseline="30000" dirty="0" smtClean="0">
+                <a:rPr lang="en-US" altLang="en-US" sz="1800" baseline="30000" dirty="0" smtClean="0">
                   <a:solidFill>
                     <a:schemeClr val="bg1"/>
                   </a:solidFill>
+                  <a:latin typeface="Tahoma" panose="020B0604030504040204" pitchFamily="34" charset="0"/>
+                  <a:ea typeface="Tahoma" panose="020B0604030504040204" pitchFamily="34" charset="0"/>
+                  <a:cs typeface="Tahoma" panose="020B0604030504040204" pitchFamily="34" charset="0"/>
                 </a:rPr>
                 <a:t>5</a:t>
               </a:r>
               <a:r>
-                <a:rPr lang="en-US" altLang="en-US" dirty="0" smtClean="0">
+                <a:rPr lang="en-US" altLang="en-US" sz="1800" dirty="0" smtClean="0">
                   <a:solidFill>
                     <a:schemeClr val="bg1"/>
                   </a:solidFill>
+                  <a:latin typeface="Tahoma" panose="020B0604030504040204" pitchFamily="34" charset="0"/>
+                  <a:ea typeface="Tahoma" panose="020B0604030504040204" pitchFamily="34" charset="0"/>
+                  <a:cs typeface="Tahoma" panose="020B0604030504040204" pitchFamily="34" charset="0"/>
                 </a:rPr>
                 <a:t>; William Harding, BS</a:t>
               </a:r>
               <a:r>
-                <a:rPr lang="en-US" altLang="en-US" baseline="30000" dirty="0" smtClean="0">
+                <a:rPr lang="en-US" altLang="en-US" sz="1800" baseline="30000" dirty="0" smtClean="0">
                   <a:solidFill>
                     <a:schemeClr val="bg1"/>
                   </a:solidFill>
+                  <a:latin typeface="Tahoma" panose="020B0604030504040204" pitchFamily="34" charset="0"/>
+                  <a:ea typeface="Tahoma" panose="020B0604030504040204" pitchFamily="34" charset="0"/>
+                  <a:cs typeface="Tahoma" panose="020B0604030504040204" pitchFamily="34" charset="0"/>
                 </a:rPr>
                 <a:t>6</a:t>
               </a:r>
               <a:r>
-                <a:rPr lang="en-US" altLang="en-US" dirty="0" smtClean="0">
+                <a:rPr lang="en-US" altLang="en-US" sz="1800" dirty="0" smtClean="0">
                   <a:solidFill>
                     <a:schemeClr val="bg1"/>
                   </a:solidFill>
+                  <a:latin typeface="Tahoma" panose="020B0604030504040204" pitchFamily="34" charset="0"/>
+                  <a:ea typeface="Tahoma" panose="020B0604030504040204" pitchFamily="34" charset="0"/>
+                  <a:cs typeface="Tahoma" panose="020B0604030504040204" pitchFamily="34" charset="0"/>
                 </a:rPr>
-                <a:t>; Celia Jordan, BS BA</a:t>
+                <a:t>; Celia Jordan, BS</a:t>
               </a:r>
               <a:r>
-                <a:rPr lang="en-US" altLang="en-US" baseline="30000" dirty="0" smtClean="0">
+                <a:rPr lang="en-US" altLang="en-US" sz="1800" baseline="30000" dirty="0" smtClean="0">
                   <a:solidFill>
                     <a:schemeClr val="bg1"/>
                   </a:solidFill>
+                  <a:latin typeface="Tahoma" panose="020B0604030504040204" pitchFamily="34" charset="0"/>
+                  <a:ea typeface="Tahoma" panose="020B0604030504040204" pitchFamily="34" charset="0"/>
+                  <a:cs typeface="Tahoma" panose="020B0604030504040204" pitchFamily="34" charset="0"/>
                 </a:rPr>
                 <a:t>7</a:t>
               </a:r>
               <a:r>
-                <a:rPr lang="en-US" altLang="en-US" dirty="0" smtClean="0">
+                <a:rPr lang="en-US" altLang="en-US" sz="1800" dirty="0" smtClean="0">
                   <a:solidFill>
                     <a:schemeClr val="bg1"/>
                   </a:solidFill>
+                  <a:latin typeface="Tahoma" panose="020B0604030504040204" pitchFamily="34" charset="0"/>
+                  <a:ea typeface="Tahoma" panose="020B0604030504040204" pitchFamily="34" charset="0"/>
+                  <a:cs typeface="Tahoma" panose="020B0604030504040204" pitchFamily="34" charset="0"/>
                 </a:rPr>
                 <a:t>; Jeremey Meier, BS</a:t>
               </a:r>
               <a:r>
-                <a:rPr lang="en-US" altLang="en-US" baseline="30000" dirty="0" smtClean="0">
+                <a:rPr lang="en-US" altLang="en-US" sz="1800" baseline="30000" dirty="0" smtClean="0">
                   <a:solidFill>
                     <a:schemeClr val="bg1"/>
                   </a:solidFill>
+                  <a:latin typeface="Tahoma" panose="020B0604030504040204" pitchFamily="34" charset="0"/>
+                  <a:ea typeface="Tahoma" panose="020B0604030504040204" pitchFamily="34" charset="0"/>
+                  <a:cs typeface="Tahoma" panose="020B0604030504040204" pitchFamily="34" charset="0"/>
                 </a:rPr>
                 <a:t>8</a:t>
               </a:r>
               <a:r>
-                <a:rPr lang="en-US" altLang="en-US" dirty="0" smtClean="0">
+                <a:rPr lang="en-US" altLang="en-US" sz="1800" dirty="0" smtClean="0">
                   <a:solidFill>
                     <a:schemeClr val="bg1"/>
                   </a:solidFill>
+                  <a:latin typeface="Tahoma" panose="020B0604030504040204" pitchFamily="34" charset="0"/>
+                  <a:ea typeface="Tahoma" panose="020B0604030504040204" pitchFamily="34" charset="0"/>
+                  <a:cs typeface="Tahoma" panose="020B0604030504040204" pitchFamily="34" charset="0"/>
                 </a:rPr>
                 <a:t>; Carmen Wong, MBA</a:t>
               </a:r>
               <a:r>
-                <a:rPr lang="en-US" altLang="en-US" baseline="30000" dirty="0" smtClean="0">
+                <a:rPr lang="en-US" altLang="en-US" sz="1800" baseline="30000" dirty="0" smtClean="0">
                   <a:solidFill>
                     <a:schemeClr val="bg1"/>
                   </a:solidFill>
+                  <a:latin typeface="Tahoma" panose="020B0604030504040204" pitchFamily="34" charset="0"/>
+                  <a:ea typeface="Tahoma" panose="020B0604030504040204" pitchFamily="34" charset="0"/>
+                  <a:cs typeface="Tahoma" panose="020B0604030504040204" pitchFamily="34" charset="0"/>
                 </a:rPr>
                 <a:t>9</a:t>
               </a:r>
               <a:r>
-                <a:rPr lang="en-US" altLang="en-US" dirty="0" smtClean="0">
+                <a:rPr lang="en-US" altLang="en-US" sz="1800" dirty="0" smtClean="0">
                   <a:solidFill>
                     <a:schemeClr val="bg1"/>
                   </a:solidFill>
+                  <a:latin typeface="Tahoma" panose="020B0604030504040204" pitchFamily="34" charset="0"/>
+                  <a:ea typeface="Tahoma" panose="020B0604030504040204" pitchFamily="34" charset="0"/>
+                  <a:cs typeface="Tahoma" panose="020B0604030504040204" pitchFamily="34" charset="0"/>
                 </a:rPr>
                 <a:t>; Brian Hoch, BS</a:t>
               </a:r>
               <a:r>
-                <a:rPr lang="en-US" altLang="en-US" baseline="30000" dirty="0" smtClean="0">
+                <a:rPr lang="en-US" altLang="en-US" sz="1800" baseline="30000" dirty="0" smtClean="0">
                   <a:solidFill>
                     <a:schemeClr val="bg1"/>
                   </a:solidFill>
+                  <a:latin typeface="Tahoma" panose="020B0604030504040204" pitchFamily="34" charset="0"/>
+                  <a:ea typeface="Tahoma" panose="020B0604030504040204" pitchFamily="34" charset="0"/>
+                  <a:cs typeface="Tahoma" panose="020B0604030504040204" pitchFamily="34" charset="0"/>
                 </a:rPr>
                 <a:t>10</a:t>
               </a:r>
-              <a:endParaRPr lang="en-US" altLang="en-US" baseline="30000" dirty="0">
+              <a:endParaRPr lang="en-US" altLang="en-US" sz="1800" baseline="30000" dirty="0">
                 <a:solidFill>
                   <a:schemeClr val="bg1"/>
                 </a:solidFill>
+                <a:latin typeface="Tahoma" panose="020B0604030504040204" pitchFamily="34" charset="0"/>
+                <a:ea typeface="Tahoma" panose="020B0604030504040204" pitchFamily="34" charset="0"/>
+                <a:cs typeface="Tahoma" panose="020B0604030504040204" pitchFamily="34" charset="0"/>
               </a:endParaRPr>
             </a:p>
             <a:p>
@@ -2432,214 +2521,247 @@
                 </a:spcBef>
               </a:pPr>
               <a:r>
-                <a:rPr lang="en-US" altLang="en-US" sz="1600" baseline="30000" dirty="0" smtClean="0">
+                <a:rPr lang="en-US" altLang="en-US" sz="1400" baseline="30000" dirty="0" smtClean="0">
                   <a:solidFill>
                     <a:schemeClr val="bg1"/>
                   </a:solidFill>
+                  <a:latin typeface="Tahoma" panose="020B0604030504040204" pitchFamily="34" charset="0"/>
+                  <a:ea typeface="Tahoma" panose="020B0604030504040204" pitchFamily="34" charset="0"/>
+                  <a:cs typeface="Tahoma" panose="020B0604030504040204" pitchFamily="34" charset="0"/>
                 </a:rPr>
                 <a:t>1</a:t>
               </a:r>
               <a:r>
-                <a:rPr lang="en-US" altLang="en-US" sz="1600" dirty="0" smtClean="0">
+                <a:rPr lang="en-US" altLang="en-US" sz="1400" dirty="0" smtClean="0">
                   <a:solidFill>
                     <a:schemeClr val="bg1"/>
                   </a:solidFill>
+                  <a:latin typeface="Tahoma" panose="020B0604030504040204" pitchFamily="34" charset="0"/>
+                  <a:ea typeface="Tahoma" panose="020B0604030504040204" pitchFamily="34" charset="0"/>
+                  <a:cs typeface="Tahoma" panose="020B0604030504040204" pitchFamily="34" charset="0"/>
                 </a:rPr>
                 <a:t>Group Health Research Institute </a:t>
               </a:r>
               <a:r>
-                <a:rPr lang="en-US" altLang="en-US" sz="1600" baseline="30000" dirty="0" smtClean="0">
+                <a:rPr lang="en-US" altLang="en-US" sz="1400" baseline="30000" dirty="0" smtClean="0">
                   <a:solidFill>
                     <a:schemeClr val="bg1"/>
                   </a:solidFill>
+                  <a:latin typeface="Tahoma" panose="020B0604030504040204" pitchFamily="34" charset="0"/>
+                  <a:ea typeface="Tahoma" panose="020B0604030504040204" pitchFamily="34" charset="0"/>
+                  <a:cs typeface="Tahoma" panose="020B0604030504040204" pitchFamily="34" charset="0"/>
                 </a:rPr>
                 <a:t>2</a:t>
               </a:r>
               <a:r>
-                <a:rPr lang="en-US" altLang="en-US" sz="1600" dirty="0" smtClean="0">
+                <a:rPr lang="en-US" altLang="en-US" sz="1400" dirty="0" smtClean="0">
                   <a:solidFill>
                     <a:schemeClr val="bg1"/>
                   </a:solidFill>
+                  <a:latin typeface="Tahoma" panose="020B0604030504040204" pitchFamily="34" charset="0"/>
+                  <a:ea typeface="Tahoma" panose="020B0604030504040204" pitchFamily="34" charset="0"/>
+                  <a:cs typeface="Tahoma" panose="020B0604030504040204" pitchFamily="34" charset="0"/>
+                </a:rPr>
+                <a:t>The Center for Health Research, Kaiser Permanente Northwest </a:t>
+              </a:r>
+              <a:r>
+                <a:rPr lang="en-US" altLang="en-US" sz="1400" baseline="30000" dirty="0" smtClean="0">
+                  <a:solidFill>
+                    <a:schemeClr val="bg1"/>
+                  </a:solidFill>
+                  <a:latin typeface="Tahoma" panose="020B0604030504040204" pitchFamily="34" charset="0"/>
+                  <a:ea typeface="Tahoma" panose="020B0604030504040204" pitchFamily="34" charset="0"/>
+                  <a:cs typeface="Tahoma" panose="020B0604030504040204" pitchFamily="34" charset="0"/>
+                </a:rPr>
+                <a:t>3</a:t>
+              </a:r>
+              <a:r>
+                <a:rPr lang="en-US" altLang="en-US" sz="1400" dirty="0" smtClean="0">
+                  <a:solidFill>
+                    <a:schemeClr val="bg1"/>
+                  </a:solidFill>
+                  <a:latin typeface="Tahoma" panose="020B0604030504040204" pitchFamily="34" charset="0"/>
+                  <a:ea typeface="Tahoma" panose="020B0604030504040204" pitchFamily="34" charset="0"/>
+                  <a:cs typeface="Tahoma" panose="020B0604030504040204" pitchFamily="34" charset="0"/>
+                </a:rPr>
+                <a:t>Meyers Primary Care Institute </a:t>
+              </a:r>
+              <a:r>
+                <a:rPr lang="en-US" altLang="en-US" sz="1400" baseline="30000" dirty="0" smtClean="0">
+                  <a:solidFill>
+                    <a:schemeClr val="bg1"/>
+                  </a:solidFill>
+                  <a:latin typeface="Tahoma" panose="020B0604030504040204" pitchFamily="34" charset="0"/>
+                  <a:ea typeface="Tahoma" panose="020B0604030504040204" pitchFamily="34" charset="0"/>
+                  <a:cs typeface="Tahoma" panose="020B0604030504040204" pitchFamily="34" charset="0"/>
+                </a:rPr>
+                <a:t>4</a:t>
+              </a:r>
+              <a:r>
+                <a:rPr lang="en-US" altLang="en-US" sz="1400" dirty="0" smtClean="0">
+                  <a:solidFill>
+                    <a:schemeClr val="bg1"/>
+                  </a:solidFill>
+                  <a:latin typeface="Tahoma" panose="020B0604030504040204" pitchFamily="34" charset="0"/>
+                  <a:ea typeface="Tahoma" panose="020B0604030504040204" pitchFamily="34" charset="0"/>
+                  <a:cs typeface="Tahoma" panose="020B0604030504040204" pitchFamily="34" charset="0"/>
+                </a:rPr>
+                <a:t>Division Of Research, Kaiser Permanente Northern California </a:t>
+              </a:r>
+              <a:r>
+                <a:rPr lang="en-US" altLang="en-US" sz="1400" baseline="30000" dirty="0" smtClean="0">
+                  <a:solidFill>
+                    <a:schemeClr val="bg1"/>
+                  </a:solidFill>
+                  <a:latin typeface="Tahoma" panose="020B0604030504040204" pitchFamily="34" charset="0"/>
+                  <a:ea typeface="Tahoma" panose="020B0604030504040204" pitchFamily="34" charset="0"/>
+                  <a:cs typeface="Tahoma" panose="020B0604030504040204" pitchFamily="34" charset="0"/>
+                </a:rPr>
+                <a:t>5</a:t>
+              </a:r>
+              <a:r>
+                <a:rPr lang="en-US" altLang="en-US" sz="1400" dirty="0" smtClean="0">
+                  <a:solidFill>
+                    <a:schemeClr val="bg1"/>
+                  </a:solidFill>
+                  <a:latin typeface="Tahoma" panose="020B0604030504040204" pitchFamily="34" charset="0"/>
+                  <a:ea typeface="Tahoma" panose="020B0604030504040204" pitchFamily="34" charset="0"/>
+                  <a:cs typeface="Tahoma" panose="020B0604030504040204" pitchFamily="34" charset="0"/>
+                </a:rPr>
+                <a:t>HealthPartners Institute for Education </a:t>
+              </a:r>
+              <a:r>
+                <a:rPr lang="en-US" altLang="en-US" sz="1400" baseline="30000" dirty="0" smtClean="0">
+                  <a:solidFill>
+                    <a:schemeClr val="bg1"/>
+                  </a:solidFill>
+                  <a:latin typeface="Tahoma" panose="020B0604030504040204" pitchFamily="34" charset="0"/>
+                  <a:ea typeface="Tahoma" panose="020B0604030504040204" pitchFamily="34" charset="0"/>
+                  <a:cs typeface="Tahoma" panose="020B0604030504040204" pitchFamily="34" charset="0"/>
+                </a:rPr>
+                <a:t>6</a:t>
+              </a:r>
+              <a:r>
+                <a:rPr lang="en-US" altLang="en-US" sz="1400" dirty="0" smtClean="0">
+                  <a:solidFill>
+                    <a:schemeClr val="bg1"/>
+                  </a:solidFill>
+                  <a:latin typeface="Tahoma" panose="020B0604030504040204" pitchFamily="34" charset="0"/>
+                  <a:ea typeface="Tahoma" panose="020B0604030504040204" pitchFamily="34" charset="0"/>
+                  <a:cs typeface="Tahoma" panose="020B0604030504040204" pitchFamily="34" charset="0"/>
+                </a:rPr>
+                <a:t>Institute for Health Research, Kaiser Permanente Colorado </a:t>
+              </a:r>
+              <a:r>
+                <a:rPr lang="en-US" altLang="en-US" sz="1400" baseline="30000" dirty="0" smtClean="0">
+                  <a:solidFill>
+                    <a:schemeClr val="bg1"/>
+                  </a:solidFill>
+                  <a:latin typeface="Tahoma" panose="020B0604030504040204" pitchFamily="34" charset="0"/>
+                  <a:ea typeface="Tahoma" panose="020B0604030504040204" pitchFamily="34" charset="0"/>
+                  <a:cs typeface="Tahoma" panose="020B0604030504040204" pitchFamily="34" charset="0"/>
+                </a:rPr>
+                <a:t>7</a:t>
+              </a:r>
+              <a:r>
+                <a:rPr lang="en-US" altLang="en-US" sz="1400" dirty="0" smtClean="0">
+                  <a:solidFill>
+                    <a:schemeClr val="bg1"/>
+                  </a:solidFill>
+                  <a:latin typeface="Tahoma" panose="020B0604030504040204" pitchFamily="34" charset="0"/>
+                  <a:ea typeface="Tahoma" panose="020B0604030504040204" pitchFamily="34" charset="0"/>
+                  <a:cs typeface="Tahoma" panose="020B0604030504040204" pitchFamily="34" charset="0"/>
+                </a:rPr>
+                <a:t>MidAtlantic Permanente Research Institute </a:t>
+              </a:r>
+              <a:r>
+                <a:rPr lang="en-US" altLang="en-US" sz="1400" baseline="30000" dirty="0" smtClean="0">
+                  <a:solidFill>
+                    <a:schemeClr val="bg1"/>
+                  </a:solidFill>
+                  <a:latin typeface="Tahoma" panose="020B0604030504040204" pitchFamily="34" charset="0"/>
+                  <a:ea typeface="Tahoma" panose="020B0604030504040204" pitchFamily="34" charset="0"/>
+                  <a:cs typeface="Tahoma" panose="020B0604030504040204" pitchFamily="34" charset="0"/>
+                </a:rPr>
+                <a:t>8</a:t>
+              </a:r>
+              <a:r>
+                <a:rPr lang="en-US" altLang="en-US" sz="1400" dirty="0" smtClean="0">
+                  <a:solidFill>
+                    <a:schemeClr val="bg1"/>
+                  </a:solidFill>
+                  <a:latin typeface="Tahoma" panose="020B0604030504040204" pitchFamily="34" charset="0"/>
+                  <a:ea typeface="Tahoma" panose="020B0604030504040204" pitchFamily="34" charset="0"/>
+                  <a:cs typeface="Tahoma" panose="020B0604030504040204" pitchFamily="34" charset="0"/>
+                </a:rPr>
+                <a:t>Essentia Institute of Rural Health </a:t>
+              </a:r>
+              <a:r>
+                <a:rPr lang="en-US" altLang="en-US" sz="1400" baseline="30000" dirty="0" smtClean="0">
+                  <a:solidFill>
+                    <a:schemeClr val="bg1"/>
+                  </a:solidFill>
+                  <a:latin typeface="Tahoma" panose="020B0604030504040204" pitchFamily="34" charset="0"/>
+                  <a:ea typeface="Tahoma" panose="020B0604030504040204" pitchFamily="34" charset="0"/>
+                  <a:cs typeface="Tahoma" panose="020B0604030504040204" pitchFamily="34" charset="0"/>
+                </a:rPr>
+                <a:t>9</a:t>
+              </a:r>
+              <a:r>
+                <a:rPr lang="en-US" altLang="en-US" sz="1400" dirty="0" smtClean="0">
+                  <a:solidFill>
+                    <a:schemeClr val="bg1"/>
+                  </a:solidFill>
+                  <a:latin typeface="Tahoma" panose="020B0604030504040204" pitchFamily="34" charset="0"/>
+                  <a:ea typeface="Tahoma" panose="020B0604030504040204" pitchFamily="34" charset="0"/>
+                  <a:cs typeface="Tahoma" panose="020B0604030504040204" pitchFamily="34" charset="0"/>
                 </a:rPr>
                 <a:t>The Center for Health Research, Kaiser Permanente </a:t>
               </a:r>
               <a:r>
-                <a:rPr lang="en-US" altLang="en-US" sz="1600" dirty="0" smtClean="0">
+                <a:rPr lang="en-US" altLang="en-US" sz="1400" dirty="0">
                   <a:solidFill>
                     <a:schemeClr val="bg1"/>
                   </a:solidFill>
-                </a:rPr>
-                <a:t>Northwest </a:t>
-              </a:r>
-              <a:r>
-                <a:rPr lang="en-US" altLang="en-US" sz="1600" baseline="30000" dirty="0" smtClean="0">
-                  <a:solidFill>
-                    <a:schemeClr val="bg1"/>
-                  </a:solidFill>
-                </a:rPr>
-                <a:t>3</a:t>
-              </a:r>
-              <a:r>
-                <a:rPr lang="en-US" altLang="en-US" sz="1600" dirty="0" smtClean="0">
-                  <a:solidFill>
-                    <a:schemeClr val="bg1"/>
-                  </a:solidFill>
-                </a:rPr>
-                <a:t>Meyers Primary Care Institute </a:t>
-              </a:r>
-              <a:r>
-                <a:rPr lang="en-US" altLang="en-US" sz="1600" baseline="30000" dirty="0" smtClean="0">
-                  <a:solidFill>
-                    <a:schemeClr val="bg1"/>
-                  </a:solidFill>
-                </a:rPr>
-                <a:t>4</a:t>
-              </a:r>
-              <a:r>
-                <a:rPr lang="en-US" altLang="en-US" sz="1600" dirty="0" smtClean="0">
-                  <a:solidFill>
-                    <a:schemeClr val="bg1"/>
-                  </a:solidFill>
-                </a:rPr>
-                <a:t>Division Of Research, Kaiser Permanente Northern California </a:t>
-              </a:r>
-              <a:r>
-                <a:rPr lang="en-US" altLang="en-US" sz="1600" baseline="30000" dirty="0" smtClean="0">
-                  <a:solidFill>
-                    <a:schemeClr val="bg1"/>
-                  </a:solidFill>
-                </a:rPr>
-                <a:t>5</a:t>
-              </a:r>
-              <a:r>
-                <a:rPr lang="en-US" altLang="en-US" sz="1600" dirty="0" smtClean="0">
-                  <a:solidFill>
-                    <a:schemeClr val="bg1"/>
-                  </a:solidFill>
-                </a:rPr>
-                <a:t>HealthPartners Institute for Education </a:t>
-              </a:r>
-              <a:r>
-                <a:rPr lang="en-US" altLang="en-US" sz="1600" baseline="30000" dirty="0" smtClean="0">
-                  <a:solidFill>
-                    <a:schemeClr val="bg1"/>
-                  </a:solidFill>
-                </a:rPr>
-                <a:t>6</a:t>
-              </a:r>
-              <a:r>
-                <a:rPr lang="en-US" altLang="en-US" sz="1600" dirty="0" smtClean="0">
-                  <a:solidFill>
-                    <a:schemeClr val="bg1"/>
-                  </a:solidFill>
-                </a:rPr>
-                <a:t>Institute for Health Research, Kaiser Permanente Colorado </a:t>
-              </a:r>
-              <a:r>
-                <a:rPr lang="en-US" altLang="en-US" sz="1600" baseline="30000" dirty="0" smtClean="0">
-                  <a:solidFill>
-                    <a:schemeClr val="bg1"/>
-                  </a:solidFill>
-                </a:rPr>
-                <a:t>7</a:t>
-              </a:r>
-              <a:r>
-                <a:rPr lang="en-US" altLang="en-US" sz="1600" dirty="0" smtClean="0">
-                  <a:solidFill>
-                    <a:schemeClr val="bg1"/>
-                  </a:solidFill>
-                </a:rPr>
-                <a:t>MidAtlantic Permanente Research Institute </a:t>
-              </a:r>
-              <a:r>
-                <a:rPr lang="en-US" altLang="en-US" sz="1600" baseline="30000" dirty="0" smtClean="0">
-                  <a:solidFill>
-                    <a:schemeClr val="bg1"/>
-                  </a:solidFill>
-                </a:rPr>
-                <a:t>8</a:t>
-              </a:r>
-              <a:r>
-                <a:rPr lang="en-US" altLang="en-US" sz="1600" dirty="0" smtClean="0">
-                  <a:solidFill>
-                    <a:schemeClr val="bg1"/>
-                  </a:solidFill>
-                </a:rPr>
-                <a:t>Essentia Institute of Rural Health </a:t>
-              </a:r>
-              <a:r>
-                <a:rPr lang="en-US" altLang="en-US" sz="1600" baseline="30000" dirty="0" smtClean="0">
-                  <a:solidFill>
-                    <a:schemeClr val="bg1"/>
-                  </a:solidFill>
-                </a:rPr>
-                <a:t>9</a:t>
-              </a:r>
-              <a:r>
-                <a:rPr lang="en-US" altLang="en-US" sz="1600" dirty="0" smtClean="0">
-                  <a:solidFill>
-                    <a:schemeClr val="bg1"/>
-                  </a:solidFill>
-                </a:rPr>
-                <a:t>The Center for Health Research, Kaiser Permanente </a:t>
-              </a:r>
-              <a:r>
-                <a:rPr lang="en-US" altLang="en-US" sz="1600" dirty="0">
-                  <a:solidFill>
-                    <a:schemeClr val="bg1"/>
-                  </a:solidFill>
+                  <a:latin typeface="Tahoma" panose="020B0604030504040204" pitchFamily="34" charset="0"/>
+                  <a:ea typeface="Tahoma" panose="020B0604030504040204" pitchFamily="34" charset="0"/>
+                  <a:cs typeface="Tahoma" panose="020B0604030504040204" pitchFamily="34" charset="0"/>
                 </a:rPr>
                 <a:t>Hawaii </a:t>
               </a:r>
               <a:r>
-                <a:rPr lang="en-US" altLang="en-US" sz="1600" baseline="30000" dirty="0">
+                <a:rPr lang="en-US" altLang="en-US" sz="1400" baseline="30000" dirty="0">
                   <a:solidFill>
                     <a:schemeClr val="bg1"/>
                   </a:solidFill>
+                  <a:latin typeface="Tahoma" panose="020B0604030504040204" pitchFamily="34" charset="0"/>
+                  <a:ea typeface="Tahoma" panose="020B0604030504040204" pitchFamily="34" charset="0"/>
+                  <a:cs typeface="Tahoma" panose="020B0604030504040204" pitchFamily="34" charset="0"/>
                 </a:rPr>
                 <a:t>10</a:t>
               </a:r>
               <a:r>
-                <a:rPr lang="en-US" altLang="en-US" sz="1600" dirty="0">
+                <a:rPr lang="en-US" altLang="en-US" sz="1400" dirty="0">
                   <a:solidFill>
                     <a:schemeClr val="bg1"/>
                   </a:solidFill>
+                  <a:latin typeface="Tahoma" panose="020B0604030504040204" pitchFamily="34" charset="0"/>
+                  <a:ea typeface="Tahoma" panose="020B0604030504040204" pitchFamily="34" charset="0"/>
+                  <a:cs typeface="Tahoma" panose="020B0604030504040204" pitchFamily="34" charset="0"/>
                 </a:rPr>
-                <a:t>Marshfield Clinic Research Foundation</a:t>
-              </a:r>
-              <a:endParaRPr lang="en-US" altLang="en-US" sz="1600" dirty="0" smtClean="0">
-                <a:solidFill>
-                  <a:schemeClr val="bg1"/>
-                </a:solidFill>
-              </a:endParaRPr>
-            </a:p>
-            <a:p>
-              <a:pPr>
-                <a:spcBef>
-                  <a:spcPts val="600"/>
-                </a:spcBef>
-              </a:pPr>
-              <a:r>
-                <a:rPr lang="en-US" altLang="en-US" sz="1600" dirty="0" smtClean="0">
-                  <a:solidFill>
-                    <a:schemeClr val="bg1"/>
-                  </a:solidFill>
-                </a:rPr>
-                <a:t>and </a:t>
+                <a:t>Marshfield Clinic Research </a:t>
               </a:r>
               <a:r>
-                <a:rPr lang="en-US" altLang="en-US" sz="1600" dirty="0">
+                <a:rPr lang="en-US" altLang="en-US" sz="1400" dirty="0" smtClean="0">
                   <a:solidFill>
                     <a:schemeClr val="bg1"/>
                   </a:solidFill>
+                  <a:latin typeface="Tahoma" panose="020B0604030504040204" pitchFamily="34" charset="0"/>
+                  <a:ea typeface="Tahoma" panose="020B0604030504040204" pitchFamily="34" charset="0"/>
+                  <a:cs typeface="Tahoma" panose="020B0604030504040204" pitchFamily="34" charset="0"/>
                 </a:rPr>
-                <a:t>Research</a:t>
+                <a:t>Foundation</a:t>
               </a:r>
-              <a:endParaRPr lang="en-US" altLang="en-US" sz="4400" dirty="0">
-                <a:solidFill>
-                  <a:schemeClr val="bg1"/>
-                </a:solidFill>
-              </a:endParaRPr>
             </a:p>
           </p:txBody>
         </p:sp>
@@ -2801,13 +2923,19 @@
                 <a:solidFill>
                   <a:schemeClr val="bg1"/>
                 </a:solidFill>
+                <a:latin typeface="Tahoma" panose="020B0604030504040204" pitchFamily="34" charset="0"/>
+                <a:ea typeface="Tahoma" panose="020B0604030504040204" pitchFamily="34" charset="0"/>
+                <a:cs typeface="Tahoma" panose="020B0604030504040204" pitchFamily="34" charset="0"/>
               </a:rPr>
-              <a:t>Implementation &amp; Results</a:t>
+              <a:t>Results</a:t>
             </a:r>
             <a:endParaRPr lang="en-US" altLang="en-US" sz="4400" dirty="0">
               <a:solidFill>
                 <a:schemeClr val="bg1"/>
               </a:solidFill>
+              <a:latin typeface="Tahoma" panose="020B0604030504040204" pitchFamily="34" charset="0"/>
+              <a:ea typeface="Tahoma" panose="020B0604030504040204" pitchFamily="34" charset="0"/>
+              <a:cs typeface="Tahoma" panose="020B0604030504040204" pitchFamily="34" charset="0"/>
             </a:endParaRPr>
           </a:p>
         </p:txBody>
@@ -2822,7 +2950,7 @@
         </p:nvSpPr>
         <p:spPr bwMode="auto">
           <a:xfrm>
-            <a:off x="28093988" y="3506788"/>
+            <a:off x="28093988" y="3352800"/>
             <a:ext cx="7624762" cy="762000"/>
           </a:xfrm>
           <a:prstGeom prst="rect">
@@ -2965,6 +3093,9 @@
                 <a:solidFill>
                   <a:schemeClr val="bg1"/>
                 </a:solidFill>
+                <a:latin typeface="Tahoma" panose="020B0604030504040204" pitchFamily="34" charset="0"/>
+                <a:ea typeface="Tahoma" panose="020B0604030504040204" pitchFamily="34" charset="0"/>
+                <a:cs typeface="Tahoma" panose="020B0604030504040204" pitchFamily="34" charset="0"/>
               </a:rPr>
               <a:t>Discussion</a:t>
             </a:r>
@@ -2972,6 +3103,9 @@
               <a:solidFill>
                 <a:schemeClr val="bg1"/>
               </a:solidFill>
+              <a:latin typeface="Tahoma" panose="020B0604030504040204" pitchFamily="34" charset="0"/>
+              <a:ea typeface="Tahoma" panose="020B0604030504040204" pitchFamily="34" charset="0"/>
+              <a:cs typeface="Tahoma" panose="020B0604030504040204" pitchFamily="34" charset="0"/>
             </a:endParaRPr>
           </a:p>
         </p:txBody>
@@ -2986,7 +3120,7 @@
         </p:nvSpPr>
         <p:spPr bwMode="auto">
           <a:xfrm>
-            <a:off x="28093988" y="10896600"/>
+            <a:off x="28093988" y="12192000"/>
             <a:ext cx="7624762" cy="762000"/>
           </a:xfrm>
           <a:prstGeom prst="rect">
@@ -3125,10 +3259,13 @@
           <a:p>
             <a:pPr algn="ctr" eaLnBrk="1" hangingPunct="1"/>
             <a:r>
-              <a:rPr lang="en-US" altLang="en-US" sz="4400">
+              <a:rPr lang="en-US" altLang="en-US" sz="4400" dirty="0">
                 <a:solidFill>
                   <a:schemeClr val="bg1"/>
                 </a:solidFill>
+                <a:latin typeface="Tahoma" panose="020B0604030504040204" pitchFamily="34" charset="0"/>
+                <a:ea typeface="Tahoma" panose="020B0604030504040204" pitchFamily="34" charset="0"/>
+                <a:cs typeface="Tahoma" panose="020B0604030504040204" pitchFamily="34" charset="0"/>
               </a:rPr>
               <a:t>Conclusion</a:t>
             </a:r>
@@ -3288,6 +3425,9 @@
                 <a:solidFill>
                   <a:schemeClr val="bg1"/>
                 </a:solidFill>
+                <a:latin typeface="Tahoma" panose="020B0604030504040204" pitchFamily="34" charset="0"/>
+                <a:ea typeface="Tahoma" panose="020B0604030504040204" pitchFamily="34" charset="0"/>
+                <a:cs typeface="Tahoma" panose="020B0604030504040204" pitchFamily="34" charset="0"/>
               </a:rPr>
               <a:t>Introduction</a:t>
             </a:r>
@@ -3304,7 +3444,7 @@
         </p:nvSpPr>
         <p:spPr bwMode="auto">
           <a:xfrm>
-            <a:off x="609362" y="11811000"/>
+            <a:off x="609362" y="11353800"/>
             <a:ext cx="8053852" cy="762000"/>
           </a:xfrm>
           <a:prstGeom prst="rect">
@@ -3447,21 +3587,19 @@
                 <a:solidFill>
                   <a:schemeClr val="bg1"/>
                 </a:solidFill>
+                <a:latin typeface="Tahoma" panose="020B0604030504040204" pitchFamily="34" charset="0"/>
+                <a:ea typeface="Tahoma" panose="020B0604030504040204" pitchFamily="34" charset="0"/>
+                <a:cs typeface="Tahoma" panose="020B0604030504040204" pitchFamily="34" charset="0"/>
               </a:rPr>
-              <a:t>The New </a:t>
-            </a:r>
-            <a:r>
-              <a:rPr lang="en-US" altLang="en-US" sz="4400" dirty="0" smtClean="0">
-                <a:solidFill>
-                  <a:schemeClr val="bg1"/>
-                </a:solidFill>
-              </a:rPr>
-              <a:t>Variables</a:t>
+              <a:t>The New Variables</a:t>
             </a:r>
             <a:endParaRPr lang="en-US" altLang="en-US" sz="4400" dirty="0">
               <a:solidFill>
                 <a:schemeClr val="bg1"/>
               </a:solidFill>
+              <a:latin typeface="Tahoma" panose="020B0604030504040204" pitchFamily="34" charset="0"/>
+              <a:ea typeface="Tahoma" panose="020B0604030504040204" pitchFamily="34" charset="0"/>
+              <a:cs typeface="Tahoma" panose="020B0604030504040204" pitchFamily="34" charset="0"/>
             </a:endParaRPr>
           </a:p>
         </p:txBody>
@@ -3475,14 +3613,14 @@
           <p:nvPr>
             <p:extLst>
               <p:ext uri="{D42A27DB-BD31-4B8C-83A1-F6EECF244321}">
-                <p14:modId xmlns:p14="http://schemas.microsoft.com/office/powerpoint/2010/main" val="3305411529"/>
+                <p14:modId xmlns:p14="http://schemas.microsoft.com/office/powerpoint/2010/main" val="342079316"/>
               </p:ext>
             </p:extLst>
           </p:nvPr>
         </p:nvGraphicFramePr>
         <p:xfrm>
-          <a:off x="586014" y="12707112"/>
-          <a:ext cx="8077200" cy="5371084"/>
+          <a:off x="586014" y="12326112"/>
+          <a:ext cx="8077200" cy="5394960"/>
         </p:xfrm>
         <a:graphic>
           <a:graphicData uri="http://schemas.openxmlformats.org/drawingml/2006/table">
@@ -4531,6 +4669,9 @@
                 <a:solidFill>
                   <a:schemeClr val="bg1"/>
                 </a:solidFill>
+                <a:latin typeface="Tahoma" panose="020B0604030504040204" pitchFamily="34" charset="0"/>
+                <a:ea typeface="Tahoma" panose="020B0604030504040204" pitchFamily="34" charset="0"/>
+                <a:cs typeface="Tahoma" panose="020B0604030504040204" pitchFamily="34" charset="0"/>
               </a:rPr>
               <a:t>The New Variables (</a:t>
             </a:r>
@@ -4539,6 +4680,9 @@
                 <a:solidFill>
                   <a:schemeClr val="bg1"/>
                 </a:solidFill>
+                <a:latin typeface="Tahoma" panose="020B0604030504040204" pitchFamily="34" charset="0"/>
+                <a:ea typeface="Tahoma" panose="020B0604030504040204" pitchFamily="34" charset="0"/>
+                <a:cs typeface="Tahoma" panose="020B0604030504040204" pitchFamily="34" charset="0"/>
               </a:rPr>
               <a:t>cont</a:t>
             </a:r>
@@ -4547,6 +4691,9 @@
                 <a:solidFill>
                   <a:schemeClr val="bg1"/>
                 </a:solidFill>
+                <a:latin typeface="Tahoma" panose="020B0604030504040204" pitchFamily="34" charset="0"/>
+                <a:ea typeface="Tahoma" panose="020B0604030504040204" pitchFamily="34" charset="0"/>
+                <a:cs typeface="Tahoma" panose="020B0604030504040204" pitchFamily="34" charset="0"/>
               </a:rPr>
               <a:t>)</a:t>
             </a:r>
@@ -4554,6 +4701,9 @@
               <a:solidFill>
                 <a:schemeClr val="bg1"/>
               </a:solidFill>
+              <a:latin typeface="Tahoma" panose="020B0604030504040204" pitchFamily="34" charset="0"/>
+              <a:ea typeface="Tahoma" panose="020B0604030504040204" pitchFamily="34" charset="0"/>
+              <a:cs typeface="Tahoma" panose="020B0604030504040204" pitchFamily="34" charset="0"/>
             </a:endParaRPr>
           </a:p>
         </p:txBody>
@@ -4708,125 +4858,163 @@
             </a:lvl9pPr>
           </a:lstStyle>
           <a:p>
-            <a:pPr marL="0" indent="0" eaLnBrk="1" hangingPunct="1">
+            <a:pPr marL="457200" indent="-457200" eaLnBrk="1" hangingPunct="1">
               <a:spcBef>
                 <a:spcPts val="0"/>
               </a:spcBef>
               <a:spcAft>
                 <a:spcPts val="1200"/>
               </a:spcAft>
+              <a:buFont typeface="Arial" panose="020B0604020202020204" pitchFamily="34" charset="0"/>
+              <a:buChar char="•"/>
             </a:pPr>
             <a:r>
-              <a:rPr lang="en-US" altLang="en-US" sz="2800" dirty="0"/>
-              <a:t>At the 2014 Annual Meeting, Bachman </a:t>
+              <a:rPr lang="en-US" altLang="en-US" sz="3200" b="1" dirty="0">
+                <a:latin typeface="Tahoma" panose="020B0604030504040204" pitchFamily="34" charset="0"/>
+                <a:ea typeface="Tahoma" panose="020B0604030504040204" pitchFamily="34" charset="0"/>
+                <a:cs typeface="Tahoma" panose="020B0604030504040204" pitchFamily="34" charset="0"/>
+              </a:rPr>
+              <a:t>Completeness of capture</a:t>
             </a:r>
             <a:r>
-              <a:rPr lang="en-US" altLang="en-US" sz="2800" dirty="0" smtClean="0"/>
-              <a:t>et al. presented </a:t>
+              <a:rPr lang="en-US" altLang="en-US" sz="3200" dirty="0">
+                <a:latin typeface="Tahoma" panose="020B0604030504040204" pitchFamily="34" charset="0"/>
+                <a:ea typeface="Tahoma" panose="020B0604030504040204" pitchFamily="34" charset="0"/>
+                <a:cs typeface="Tahoma" panose="020B0604030504040204" pitchFamily="34" charset="0"/>
+              </a:rPr>
+              <a:t> is often crucial for HCSRN research</a:t>
             </a:r>
             <a:r>
-              <a:rPr lang="en-US" altLang="en-US" sz="2800" dirty="0"/>
-              <a:t>an excellent investigation into </a:t>
+              <a:rPr lang="en-US" altLang="en-US" sz="3200" dirty="0" smtClean="0">
+                <a:latin typeface="Tahoma" panose="020B0604030504040204" pitchFamily="34" charset="0"/>
+                <a:ea typeface="Tahoma" panose="020B0604030504040204" pitchFamily="34" charset="0"/>
+                <a:cs typeface="Tahoma" panose="020B0604030504040204" pitchFamily="34" charset="0"/>
+              </a:rPr>
+              <a:t>.</a:t>
+            </a:r>
+          </a:p>
+          <a:p>
+            <a:pPr marL="457200" indent="-457200" eaLnBrk="1" hangingPunct="1">
+              <a:spcBef>
+                <a:spcPts val="0"/>
+              </a:spcBef>
+              <a:spcAft>
+                <a:spcPts val="1200"/>
+              </a:spcAft>
+              <a:buFont typeface="Arial" panose="020B0604020202020204" pitchFamily="34" charset="0"/>
+              <a:buChar char="•"/>
+            </a:pPr>
+            <a:r>
+              <a:rPr lang="en-US" altLang="en-US" sz="3200" dirty="0">
+                <a:latin typeface="Tahoma" panose="020B0604030504040204" pitchFamily="34" charset="0"/>
+                <a:ea typeface="Tahoma" panose="020B0604030504040204" pitchFamily="34" charset="0"/>
+                <a:cs typeface="Tahoma" panose="020B0604030504040204" pitchFamily="34" charset="0"/>
+              </a:rPr>
+              <a:t>Bachman et al.'s 2014 investigation found </a:t>
             </a:r>
             <a:r>
-              <a:rPr lang="en-US" altLang="en-US" sz="2800" dirty="0" smtClean="0"/>
-              <a:t>VDW enrollment’s </a:t>
-            </a:r>
-            <a:r>
-              <a:rPr lang="en-US" altLang="en-US" sz="2800" dirty="0"/>
-              <a:t>OUTSIDE_UTILIZATION field, which purported to flag </a:t>
-            </a:r>
-            <a:r>
-              <a:rPr lang="en-US" altLang="en-US" sz="2800" dirty="0" smtClean="0"/>
-              <a:t>periods of suspect capture of either </a:t>
-            </a:r>
-            <a:r>
-              <a:rPr lang="en-US" altLang="en-US" sz="2800" dirty="0"/>
-              <a:t>pharmacy or encounter </a:t>
-            </a:r>
-            <a:r>
-              <a:rPr lang="en-US" altLang="en-US" sz="2800" dirty="0" smtClean="0"/>
-              <a:t>data. </a:t>
-            </a:r>
-            <a:endParaRPr lang="en-US" altLang="en-US" sz="2800" dirty="0"/>
-          </a:p>
-          <a:p>
-            <a:pPr marL="0" indent="0" eaLnBrk="1" hangingPunct="1">
-              <a:spcBef>
-                <a:spcPct val="5000"/>
-              </a:spcBef>
-              <a:spcAft>
-                <a:spcPts val="1200"/>
-              </a:spcAft>
-            </a:pPr>
-            <a:r>
-              <a:rPr lang="en-US" altLang="en-US" sz="2800" dirty="0" smtClean="0"/>
-              <a:t>That </a:t>
-            </a:r>
-            <a:r>
-              <a:rPr lang="en-US" altLang="en-US" sz="2800" dirty="0"/>
-              <a:t>investigation revealed </a:t>
-            </a:r>
-            <a:r>
-              <a:rPr lang="en-US" altLang="en-US" sz="2800" b="1" dirty="0"/>
+              <a:rPr lang="en-US" altLang="en-US" sz="3200" b="1" dirty="0">
+                <a:latin typeface="Tahoma" panose="020B0604030504040204" pitchFamily="34" charset="0"/>
+                <a:ea typeface="Tahoma" panose="020B0604030504040204" pitchFamily="34" charset="0"/>
+                <a:cs typeface="Tahoma" panose="020B0604030504040204" pitchFamily="34" charset="0"/>
+              </a:rPr>
               <a:t>serious problems</a:t>
             </a:r>
             <a:r>
-              <a:rPr lang="en-US" altLang="en-US" sz="2800" dirty="0"/>
-              <a:t> with the flag, calling its usefulness into question. </a:t>
+              <a:rPr lang="en-US" altLang="en-US" sz="3200" dirty="0">
+                <a:latin typeface="Tahoma" panose="020B0604030504040204" pitchFamily="34" charset="0"/>
+                <a:ea typeface="Tahoma" panose="020B0604030504040204" pitchFamily="34" charset="0"/>
+                <a:cs typeface="Tahoma" panose="020B0604030504040204" pitchFamily="34" charset="0"/>
+              </a:rPr>
+              <a:t> with implementations the then-existing enrollment flag for incomplete capture.</a:t>
             </a:r>
           </a:p>
           <a:p>
-            <a:pPr marL="0" indent="0" eaLnBrk="1" hangingPunct="1">
-              <a:spcBef>
-                <a:spcPct val="5000"/>
+            <a:pPr marL="457200" indent="-457200" eaLnBrk="1" hangingPunct="1">
+              <a:spcBef>
+                <a:spcPts val="0"/>
               </a:spcBef>
               <a:spcAft>
                 <a:spcPts val="1200"/>
               </a:spcAft>
+              <a:buFont typeface="Arial" panose="020B0604020202020204" pitchFamily="34" charset="0"/>
+              <a:buChar char="•"/>
             </a:pPr>
             <a:r>
-              <a:rPr lang="en-US" altLang="en-US" sz="2800" dirty="0" smtClean="0"/>
-              <a:t>Taking </a:t>
+              <a:rPr lang="en-US" altLang="en-US" sz="3200" dirty="0">
+                <a:latin typeface="Tahoma" panose="020B0604030504040204" pitchFamily="34" charset="0"/>
+                <a:ea typeface="Tahoma" panose="020B0604030504040204" pitchFamily="34" charset="0"/>
+                <a:cs typeface="Tahoma" panose="020B0604030504040204" pitchFamily="34" charset="0"/>
+              </a:rPr>
+              <a:t>VDW Implementation Group quickly approved a </a:t>
             </a:r>
             <a:r>
-              <a:rPr lang="en-US" altLang="en-US" sz="2800" dirty="0"/>
-              <a:t>this to heart, the </a:t>
+              <a:rPr lang="en-US" altLang="en-US" sz="3200" b="1" dirty="0">
+                <a:latin typeface="Tahoma" panose="020B0604030504040204" pitchFamily="34" charset="0"/>
+                <a:ea typeface="Tahoma" panose="020B0604030504040204" pitchFamily="34" charset="0"/>
+                <a:cs typeface="Tahoma" panose="020B0604030504040204" pitchFamily="34" charset="0"/>
+              </a:rPr>
+              <a:t>spec change</a:t>
             </a:r>
             <a:r>
-              <a:rPr lang="en-US" altLang="en-US" sz="2800" dirty="0" smtClean="0"/>
-              <a:t>VDW Implementation Group approved spec changes removing </a:t>
-            </a:r>
-            <a:r>
-              <a:rPr lang="en-US" altLang="en-US" sz="2800" dirty="0"/>
-              <a:t>this field, and adding a suite of </a:t>
-            </a:r>
-            <a:r>
-              <a:rPr lang="en-US" altLang="en-US" sz="2800" b="1" dirty="0"/>
-              <a:t>six new flags</a:t>
-            </a:r>
-            <a:r>
-              <a:rPr lang="en-US" altLang="en-US" sz="2800" dirty="0"/>
-              <a:t>, </a:t>
-            </a:r>
-            <a:r>
-              <a:rPr lang="en-US" altLang="en-US" sz="2800" dirty="0" smtClean="0"/>
-              <a:t>which allow sites to express any cautions they may have about capture of specific types of data.</a:t>
+              <a:rPr lang="en-US" altLang="en-US" sz="3200" dirty="0">
+                <a:latin typeface="Tahoma" panose="020B0604030504040204" pitchFamily="34" charset="0"/>
+                <a:ea typeface="Tahoma" panose="020B0604030504040204" pitchFamily="34" charset="0"/>
+                <a:cs typeface="Tahoma" panose="020B0604030504040204" pitchFamily="34" charset="0"/>
+              </a:rPr>
+              <a:t> aimed at improving our description of data capture of VDW cohorts.</a:t>
             </a:r>
           </a:p>
           <a:p>
-            <a:pPr marL="0" indent="0" eaLnBrk="1" hangingPunct="1">
-              <a:spcBef>
-                <a:spcPct val="5000"/>
-              </a:spcBef>
+            <a:pPr marL="457200" indent="-457200" eaLnBrk="1" hangingPunct="1">
+              <a:spcBef>
+                <a:spcPts val="0"/>
+              </a:spcBef>
+              <a:spcAft>
+                <a:spcPts val="1200"/>
+              </a:spcAft>
+              <a:buFont typeface="Arial" panose="020B0604020202020204" pitchFamily="34" charset="0"/>
+              <a:buChar char="•"/>
             </a:pPr>
             <a:r>
-              <a:rPr lang="en-US" altLang="en-US" sz="2800" dirty="0" smtClean="0"/>
-              <a:t>These </a:t>
+              <a:rPr lang="en-US" altLang="en-US" sz="3200" dirty="0">
+                <a:latin typeface="Tahoma" panose="020B0604030504040204" pitchFamily="34" charset="0"/>
+                <a:ea typeface="Tahoma" panose="020B0604030504040204" pitchFamily="34" charset="0"/>
+                <a:cs typeface="Tahoma" panose="020B0604030504040204" pitchFamily="34" charset="0"/>
+              </a:rPr>
+              <a:t>This poster describes </a:t>
             </a:r>
             <a:r>
-              <a:rPr lang="en-US" altLang="en-US" sz="2800" dirty="0"/>
-              <a:t>flags are assigned by local VDW analysts on the basis of their knowledge of data capture limitations at their site for identifiable subgroups of patients. </a:t>
+              <a:rPr lang="en-US" altLang="en-US" sz="3200" b="1" dirty="0">
+                <a:latin typeface="Tahoma" panose="020B0604030504040204" pitchFamily="34" charset="0"/>
+                <a:ea typeface="Tahoma" panose="020B0604030504040204" pitchFamily="34" charset="0"/>
+                <a:cs typeface="Tahoma" panose="020B0604030504040204" pitchFamily="34" charset="0"/>
+              </a:rPr>
+              <a:t>the new variables</a:t>
+            </a:r>
+            <a:r>
+              <a:rPr lang="en-US" altLang="en-US" sz="3200" dirty="0">
+                <a:latin typeface="Tahoma" panose="020B0604030504040204" pitchFamily="34" charset="0"/>
+                <a:ea typeface="Tahoma" panose="020B0604030504040204" pitchFamily="34" charset="0"/>
+                <a:cs typeface="Tahoma" panose="020B0604030504040204" pitchFamily="34" charset="0"/>
+              </a:rPr>
+              <a:t> and their early </a:t>
+            </a:r>
+            <a:r>
+              <a:rPr lang="en-US" altLang="en-US" sz="3200" b="1" dirty="0">
+                <a:latin typeface="Tahoma" panose="020B0604030504040204" pitchFamily="34" charset="0"/>
+                <a:ea typeface="Tahoma" panose="020B0604030504040204" pitchFamily="34" charset="0"/>
+                <a:cs typeface="Tahoma" panose="020B0604030504040204" pitchFamily="34" charset="0"/>
+              </a:rPr>
+              <a:t>implementations</a:t>
+            </a:r>
+            <a:r>
+              <a:rPr lang="en-US" altLang="en-US" sz="3200" dirty="0">
+                <a:latin typeface="Tahoma" panose="020B0604030504040204" pitchFamily="34" charset="0"/>
+                <a:ea typeface="Tahoma" panose="020B0604030504040204" pitchFamily="34" charset="0"/>
+                <a:cs typeface="Tahoma" panose="020B0604030504040204" pitchFamily="34" charset="0"/>
+              </a:rPr>
+              <a:t>.</a:t>
             </a:r>
           </a:p>
         </p:txBody>
@@ -4842,7 +5030,7 @@
         <p:spPr bwMode="auto">
           <a:xfrm>
             <a:off x="17640618" y="7536546"/>
-            <a:ext cx="4572639" cy="989013"/>
+            <a:ext cx="4809013" cy="989013"/>
           </a:xfrm>
           <a:prstGeom prst="rect">
             <a:avLst/>
@@ -4987,10 +5175,18 @@
               </a:spcBef>
             </a:pPr>
             <a:r>
-              <a:rPr lang="en-US" altLang="en-US" dirty="0" smtClean="0"/>
-              <a:t>The outpatient pharmacy flag is the most consistently well-implemented flag of the six.  Very clear separation between the SI and NSI values.</a:t>
+              <a:rPr lang="en-US" altLang="en-US" sz="1800" dirty="0" smtClean="0">
+                <a:latin typeface="Tahoma" panose="020B0604030504040204" pitchFamily="34" charset="0"/>
+                <a:ea typeface="Tahoma" panose="020B0604030504040204" pitchFamily="34" charset="0"/>
+                <a:cs typeface="Tahoma" panose="020B0604030504040204" pitchFamily="34" charset="0"/>
+              </a:rPr>
+              <a:t>Outpatient pharmacy flag is the most consistently well-implemented flag of the six. Clear separation between SI and NSI rates..</a:t>
             </a:r>
-            <a:endParaRPr lang="en-US" altLang="en-US" dirty="0"/>
+            <a:endParaRPr lang="en-US" altLang="en-US" sz="1800" dirty="0">
+              <a:latin typeface="Tahoma" panose="020B0604030504040204" pitchFamily="34" charset="0"/>
+              <a:ea typeface="Tahoma" panose="020B0604030504040204" pitchFamily="34" charset="0"/>
+              <a:cs typeface="Tahoma" panose="020B0604030504040204" pitchFamily="34" charset="0"/>
+            </a:endParaRPr>
           </a:p>
         </p:txBody>
       </p:sp>
@@ -5152,25 +5348,26 @@
               <a:buChar char="•"/>
             </a:pPr>
             <a:r>
-              <a:rPr lang="en-US" altLang="en-US" sz="2800" dirty="0" smtClean="0"/>
-              <a:t>Implementation of the new flags is essentially </a:t>
+              <a:rPr lang="en-US" altLang="en-US" sz="3200" dirty="0" smtClean="0">
+                <a:latin typeface="Tahoma" panose="020B0604030504040204" pitchFamily="34" charset="0"/>
+                <a:ea typeface="Tahoma" panose="020B0604030504040204" pitchFamily="34" charset="0"/>
+                <a:cs typeface="Tahoma" panose="020B0604030504040204" pitchFamily="34" charset="0"/>
+              </a:rPr>
+              <a:t>Implementation of the new flags is </a:t>
             </a:r>
             <a:r>
-              <a:rPr lang="en-US" altLang="en-US" sz="2800" b="1" dirty="0" smtClean="0"/>
-              <a:t>optional</a:t>
+              <a:rPr lang="en-US" altLang="en-US" sz="3200" b="1" dirty="0" smtClean="0">
+                <a:latin typeface="Tahoma" panose="020B0604030504040204" pitchFamily="34" charset="0"/>
+                <a:ea typeface="Tahoma" panose="020B0604030504040204" pitchFamily="34" charset="0"/>
+                <a:cs typeface="Tahoma" panose="020B0604030504040204" pitchFamily="34" charset="0"/>
+              </a:rPr>
+              <a:t>optional.</a:t>
             </a:r>
-            <a:r>
-              <a:rPr lang="en-US" altLang="en-US" sz="2800" dirty="0" smtClean="0"/>
-              <a:t>—sites must have the fields in th</a:t>
-            </a:r>
-            <a:r>
-              <a:rPr lang="en-US" altLang="en-US" sz="2800" dirty="0" smtClean="0"/>
-              <a:t>e table</a:t>
-            </a:r>
-            <a:r>
-              <a:rPr lang="en-US" altLang="en-US" sz="2800" dirty="0" smtClean="0"/>
-              <a:t>, but can opt to use the ‘X’ value to signify no substantive implementation.</a:t>
-            </a:r>
+            <a:endParaRPr lang="en-US" altLang="en-US" sz="3200" dirty="0" smtClean="0">
+              <a:latin typeface="Tahoma" panose="020B0604030504040204" pitchFamily="34" charset="0"/>
+              <a:ea typeface="Tahoma" panose="020B0604030504040204" pitchFamily="34" charset="0"/>
+              <a:cs typeface="Tahoma" panose="020B0604030504040204" pitchFamily="34" charset="0"/>
+            </a:endParaRPr>
           </a:p>
           <a:p>
             <a:pPr marL="796925" lvl="1" indent="-457200" defTabSz="274320" eaLnBrk="1" hangingPunct="1">
@@ -5181,32 +5378,11 @@
               <a:buChar char="•"/>
             </a:pPr>
             <a:r>
-              <a:rPr lang="en-US" altLang="en-US" sz="2800" dirty="0" smtClean="0"/>
-              <a:t>In practical terms, w</a:t>
-            </a:r>
-            <a:r>
-              <a:rPr lang="en-US" altLang="en-US" sz="2800" dirty="0" smtClean="0"/>
-              <a:t>e recommend interpreting </a:t>
-            </a:r>
-            <a:r>
-              <a:rPr lang="en-US" altLang="en-US" sz="2800" dirty="0" err="1" smtClean="0"/>
-              <a:t>Xs</a:t>
-            </a:r>
-            <a:r>
-              <a:rPr lang="en-US" altLang="en-US" sz="2800" dirty="0" smtClean="0"/>
-              <a:t> the same as Ns.</a:t>
-            </a:r>
-          </a:p>
-          <a:p>
-            <a:pPr marL="796925" lvl="1" indent="-457200" defTabSz="274320" eaLnBrk="1" hangingPunct="1">
-              <a:spcBef>
-                <a:spcPct val="5000"/>
-              </a:spcBef>
-              <a:buFont typeface="Arial" panose="020B0604020202020204" pitchFamily="34" charset="0"/>
-              <a:buChar char="•"/>
-            </a:pPr>
-            <a:r>
-              <a:rPr lang="en-US" altLang="en-US" sz="2800" dirty="0" smtClean="0"/>
+              <a:rPr lang="en-US" altLang="en-US" sz="3200" dirty="0" smtClean="0">
+                <a:latin typeface="Tahoma" panose="020B0604030504040204" pitchFamily="34" charset="0"/>
+                <a:ea typeface="Tahoma" panose="020B0604030504040204" pitchFamily="34" charset="0"/>
+                <a:cs typeface="Tahoma" panose="020B0604030504040204" pitchFamily="34" charset="0"/>
+              </a:rPr>
               <a:t>Thus far 8 sites have implemented (7 are shown here).</a:t>
             </a:r>
           </a:p>
@@ -5219,26 +5395,62 @@
               <a:buChar char="•"/>
             </a:pPr>
             <a:r>
-              <a:rPr lang="en-US" altLang="en-US" sz="2800" dirty="0" smtClean="0"/>
+              <a:rPr lang="en-US" altLang="en-US" sz="3200" dirty="0" smtClean="0">
+                <a:latin typeface="Tahoma" panose="020B0604030504040204" pitchFamily="34" charset="0"/>
+                <a:ea typeface="Tahoma" panose="020B0604030504040204" pitchFamily="34" charset="0"/>
+                <a:cs typeface="Tahoma" panose="020B0604030504040204" pitchFamily="34" charset="0"/>
+              </a:rPr>
               <a:t>A value of ‘N’ </a:t>
             </a:r>
             <a:r>
-              <a:rPr lang="en-US" altLang="en-US" sz="2800" b="1" dirty="0" smtClean="0"/>
+              <a:rPr lang="en-US" altLang="en-US" sz="3200" b="1" dirty="0" smtClean="0">
+                <a:latin typeface="Tahoma" panose="020B0604030504040204" pitchFamily="34" charset="0"/>
+                <a:ea typeface="Tahoma" panose="020B0604030504040204" pitchFamily="34" charset="0"/>
+                <a:cs typeface="Tahoma" panose="020B0604030504040204" pitchFamily="34" charset="0"/>
+              </a:rPr>
               <a:t>is not an assertion that capture is complete</a:t>
             </a:r>
             <a:r>
-              <a:rPr lang="en-US" altLang="en-US" sz="2800" dirty="0" smtClean="0"/>
-              <a:t>.  All ‘N’ means is that the implementing site </a:t>
+              <a:rPr lang="en-US" altLang="en-US" sz="3200" dirty="0" smtClean="0">
+                <a:latin typeface="Tahoma" panose="020B0604030504040204" pitchFamily="34" charset="0"/>
+                <a:ea typeface="Tahoma" panose="020B0604030504040204" pitchFamily="34" charset="0"/>
+                <a:cs typeface="Tahoma" panose="020B0604030504040204" pitchFamily="34" charset="0"/>
+              </a:rPr>
+              <a:t>.  </a:t>
+            </a:r>
+          </a:p>
+          <a:p>
+            <a:pPr marL="812800" indent="-457200" eaLnBrk="1" hangingPunct="1">
+              <a:spcBef>
+                <a:spcPct val="5000"/>
+              </a:spcBef>
+              <a:buFont typeface="Arial" panose="020B0604020202020204" pitchFamily="34" charset="0"/>
+              <a:buChar char="•"/>
+            </a:pPr>
+            <a:r>
+              <a:rPr lang="en-US" altLang="en-US" sz="3200" dirty="0" smtClean="0">
+                <a:latin typeface="Tahoma" panose="020B0604030504040204" pitchFamily="34" charset="0"/>
+                <a:ea typeface="Tahoma" panose="020B0604030504040204" pitchFamily="34" charset="0"/>
+                <a:cs typeface="Tahoma" panose="020B0604030504040204" pitchFamily="34" charset="0"/>
+              </a:rPr>
+              <a:t>All ‘N’ means is that the implementing site </a:t>
             </a:r>
             <a:r>
-              <a:rPr lang="en-US" altLang="en-US" sz="2800" i="1" dirty="0" smtClean="0"/>
+              <a:rPr lang="en-US" altLang="en-US" sz="3200" i="1" dirty="0" smtClean="0">
+                <a:latin typeface="Tahoma" panose="020B0604030504040204" pitchFamily="34" charset="0"/>
+                <a:ea typeface="Tahoma" panose="020B0604030504040204" pitchFamily="34" charset="0"/>
+                <a:cs typeface="Tahoma" panose="020B0604030504040204" pitchFamily="34" charset="0"/>
+              </a:rPr>
               <a:t>does not know</a:t>
             </a:r>
             <a:r>
-              <a:rPr lang="en-US" altLang="en-US" sz="2800" dirty="0" smtClean="0"/>
+              <a:rPr lang="en-US" altLang="en-US" sz="3200" dirty="0" smtClean="0">
+                <a:latin typeface="Tahoma" panose="020B0604030504040204" pitchFamily="34" charset="0"/>
+                <a:ea typeface="Tahoma" panose="020B0604030504040204" pitchFamily="34" charset="0"/>
+                <a:cs typeface="Tahoma" panose="020B0604030504040204" pitchFamily="34" charset="0"/>
+              </a:rPr>
               <a:t> of a reason why capture should be incomplete.</a:t>
             </a:r>
-            <a:endParaRPr lang="en-US" altLang="en-US" sz="2800" dirty="0" smtClean="0"/>
           </a:p>
         </p:txBody>
       </p:sp>
@@ -5282,7 +5494,7 @@
         </p:nvSpPr>
         <p:spPr bwMode="auto">
           <a:xfrm>
-            <a:off x="17602200" y="11963401"/>
+            <a:off x="17602200" y="11812587"/>
             <a:ext cx="4572639" cy="989013"/>
           </a:xfrm>
           <a:prstGeom prst="rect">
@@ -5428,10 +5640,13 @@
               </a:spcBef>
             </a:pPr>
             <a:r>
-              <a:rPr lang="en-US" altLang="en-US" dirty="0" smtClean="0"/>
+              <a:rPr lang="en-US" altLang="en-US" sz="1800" dirty="0">
+                <a:latin typeface="Tahoma" panose="020B0604030504040204" pitchFamily="34" charset="0"/>
+                <a:ea typeface="Tahoma" panose="020B0604030504040204" pitchFamily="34" charset="0"/>
+                <a:cs typeface="Tahoma" panose="020B0604030504040204" pitchFamily="34" charset="0"/>
+              </a:rPr>
               <a:t>The lab results flag is similarly well implemented at the sites. Note that Marshfield clinic has no enrollees whose lab data capture is suspect.</a:t>
             </a:r>
-            <a:endParaRPr lang="en-US" altLang="en-US" dirty="0"/>
           </a:p>
         </p:txBody>
       </p:sp>
@@ -5445,7 +5660,7 @@
         </p:nvSpPr>
         <p:spPr bwMode="auto">
           <a:xfrm>
-            <a:off x="17602200" y="16380444"/>
+            <a:off x="17602200" y="16613187"/>
             <a:ext cx="4572639" cy="989013"/>
           </a:xfrm>
           <a:prstGeom prst="rect">
@@ -5591,10 +5806,13 @@
               </a:spcBef>
             </a:pPr>
             <a:r>
-              <a:rPr lang="en-US" altLang="en-US" dirty="0" smtClean="0"/>
+              <a:rPr lang="en-US" altLang="en-US" sz="1800" dirty="0">
+                <a:latin typeface="Tahoma" panose="020B0604030504040204" pitchFamily="34" charset="0"/>
+                <a:ea typeface="Tahoma" panose="020B0604030504040204" pitchFamily="34" charset="0"/>
+                <a:cs typeface="Tahoma" panose="020B0604030504040204" pitchFamily="34" charset="0"/>
+              </a:rPr>
               <a:t>The inpatient flag implementations are less uniformly high quality.  Of the four sites with SI values 2 show good separation overall, and a third starts to get good around 2010.</a:t>
             </a:r>
-            <a:endParaRPr lang="en-US" altLang="en-US" dirty="0"/>
           </a:p>
         </p:txBody>
       </p:sp>
@@ -5608,7 +5826,7 @@
         </p:nvSpPr>
         <p:spPr bwMode="auto">
           <a:xfrm>
-            <a:off x="22588599" y="7620000"/>
+            <a:off x="22607649" y="7536546"/>
             <a:ext cx="4572639" cy="989013"/>
           </a:xfrm>
           <a:prstGeom prst="rect">
@@ -5754,10 +5972,13 @@
               </a:spcBef>
             </a:pPr>
             <a:r>
-              <a:rPr lang="en-US" altLang="en-US" dirty="0" smtClean="0"/>
+              <a:rPr lang="en-US" altLang="en-US" sz="1800" dirty="0">
+                <a:latin typeface="Tahoma" panose="020B0604030504040204" pitchFamily="34" charset="0"/>
+                <a:ea typeface="Tahoma" panose="020B0604030504040204" pitchFamily="34" charset="0"/>
+                <a:cs typeface="Tahoma" panose="020B0604030504040204" pitchFamily="34" charset="0"/>
+              </a:rPr>
               <a:t>For tumor, two of the four sites with SI values show excellent separation overall.</a:t>
             </a:r>
-            <a:endParaRPr lang="en-US" altLang="en-US" dirty="0"/>
           </a:p>
         </p:txBody>
       </p:sp>
@@ -5771,7 +5992,7 @@
         </p:nvSpPr>
         <p:spPr bwMode="auto">
           <a:xfrm>
-            <a:off x="22626698" y="16380444"/>
+            <a:off x="22607649" y="16613187"/>
             <a:ext cx="4572639" cy="989013"/>
           </a:xfrm>
           <a:prstGeom prst="rect">
@@ -5917,10 +6138,13 @@
               </a:spcBef>
             </a:pPr>
             <a:r>
-              <a:rPr lang="en-US" altLang="en-US" dirty="0" smtClean="0"/>
+              <a:rPr lang="en-US" altLang="en-US" sz="1800" dirty="0">
+                <a:latin typeface="Tahoma" panose="020B0604030504040204" pitchFamily="34" charset="0"/>
+                <a:ea typeface="Tahoma" panose="020B0604030504040204" pitchFamily="34" charset="0"/>
+                <a:cs typeface="Tahoma" panose="020B0604030504040204" pitchFamily="34" charset="0"/>
+              </a:rPr>
               <a:t>Here we have four sites with SI values, two of which have good separation from the NSI rates.</a:t>
             </a:r>
-            <a:endParaRPr lang="en-US" altLang="en-US" dirty="0"/>
           </a:p>
         </p:txBody>
       </p:sp>
@@ -5934,7 +6158,7 @@
         </p:nvSpPr>
         <p:spPr bwMode="auto">
           <a:xfrm>
-            <a:off x="22626698" y="11734800"/>
+            <a:off x="22607649" y="11812587"/>
             <a:ext cx="4572639" cy="989013"/>
           </a:xfrm>
           <a:prstGeom prst="rect">
@@ -6080,14 +6304,13 @@
               </a:spcBef>
             </a:pPr>
             <a:r>
-              <a:rPr lang="en-US" altLang="en-US" dirty="0" smtClean="0"/>
-              <a:t>Six sites have SI values on EMR data (here signified by social history data).  Implementations are all good post-2010. </a:t>
+              <a:rPr lang="en-US" altLang="en-US" sz="1800" dirty="0">
+                <a:latin typeface="Tahoma" panose="020B0604030504040204" pitchFamily="34" charset="0"/>
+                <a:ea typeface="Tahoma" panose="020B0604030504040204" pitchFamily="34" charset="0"/>
+                <a:cs typeface="Tahoma" panose="020B0604030504040204" pitchFamily="34" charset="0"/>
+              </a:rPr>
+              <a:t>Six sites have SI values on EMR data (here signified by social history data).  Implementations are all good post-2010. KPCO and KPNC are excellent overall.</a:t>
             </a:r>
-            <a:r>
-              <a:rPr lang="en-US" altLang="en-US" dirty="0" smtClean="0"/>
-              <a:t>KPCO and KPNC are excellent overall.</a:t>
-            </a:r>
-            <a:endParaRPr lang="en-US" altLang="en-US" dirty="0"/>
           </a:p>
         </p:txBody>
       </p:sp>
@@ -6101,7 +6324,7 @@
         </p:nvSpPr>
         <p:spPr bwMode="auto">
           <a:xfrm>
-            <a:off x="28093987" y="4571999"/>
+            <a:off x="28093987" y="4343400"/>
             <a:ext cx="7624763" cy="5999163"/>
           </a:xfrm>
           <a:prstGeom prst="rect">
@@ -6134,51 +6357,36 @@
         <p:txBody>
           <a:bodyPr/>
           <a:lstStyle>
-            <a:lvl1pPr marL="228600" indent="-228600" eaLnBrk="0" hangingPunct="0">
-              <a:defRPr sz="2000">
-                <a:solidFill>
-                  <a:schemeClr val="tx1"/>
-                </a:solidFill>
-                <a:latin typeface="Arial" charset="0"/>
-                <a:ea typeface="ＭＳ Ｐゴシック" pitchFamily="-112" charset="-128"/>
+            <a:defPPr>
+              <a:defRPr lang="en-US"/>
+            </a:defPPr>
+            <a:lvl1pPr marL="457200" indent="-457200" eaLnBrk="1" hangingPunct="1">
+              <a:spcBef>
+                <a:spcPct val="5000"/>
+              </a:spcBef>
+              <a:buFont typeface="Arial" panose="020B0604020202020204" pitchFamily="34" charset="0"/>
+              <a:buChar char="•"/>
+              <a:defRPr sz="3200">
+                <a:latin typeface="Tahoma" panose="020B0604030504040204" pitchFamily="34" charset="0"/>
+                <a:ea typeface="Tahoma" panose="020B0604030504040204" pitchFamily="34" charset="0"/>
+                <a:cs typeface="Tahoma" panose="020B0604030504040204" pitchFamily="34" charset="0"/>
               </a:defRPr>
             </a:lvl1pPr>
-            <a:lvl2pPr marL="37931725" indent="-37474525" eaLnBrk="0" hangingPunct="0">
-              <a:defRPr sz="2000">
-                <a:solidFill>
-                  <a:schemeClr val="tx1"/>
-                </a:solidFill>
-                <a:latin typeface="Arial" charset="0"/>
-                <a:ea typeface="ＭＳ Ｐゴシック" pitchFamily="-112" charset="-128"/>
+            <a:lvl2pPr marL="796925" lvl="1" indent="-457200" defTabSz="274320" eaLnBrk="1" hangingPunct="1">
+              <a:spcBef>
+                <a:spcPct val="5000"/>
+              </a:spcBef>
+              <a:buFont typeface="Arial" panose="020B0604020202020204" pitchFamily="34" charset="0"/>
+              <a:buChar char="•"/>
+              <a:defRPr sz="3200">
+                <a:latin typeface="Tahoma" panose="020B0604030504040204" pitchFamily="34" charset="0"/>
+                <a:ea typeface="Tahoma" panose="020B0604030504040204" pitchFamily="34" charset="0"/>
+                <a:cs typeface="Tahoma" panose="020B0604030504040204" pitchFamily="34" charset="0"/>
               </a:defRPr>
             </a:lvl2pPr>
-            <a:lvl3pPr eaLnBrk="0" hangingPunct="0">
-              <a:defRPr sz="2000">
-                <a:solidFill>
-                  <a:schemeClr val="tx1"/>
-                </a:solidFill>
-                <a:latin typeface="Arial" charset="0"/>
-                <a:ea typeface="ＭＳ Ｐゴシック" pitchFamily="-112" charset="-128"/>
-              </a:defRPr>
-            </a:lvl3pPr>
-            <a:lvl4pPr eaLnBrk="0" hangingPunct="0">
-              <a:defRPr sz="2000">
-                <a:solidFill>
-                  <a:schemeClr val="tx1"/>
-                </a:solidFill>
-                <a:latin typeface="Arial" charset="0"/>
-                <a:ea typeface="ＭＳ Ｐゴシック" pitchFamily="-112" charset="-128"/>
-              </a:defRPr>
-            </a:lvl4pPr>
-            <a:lvl5pPr eaLnBrk="0" hangingPunct="0">
-              <a:defRPr sz="2000">
-                <a:solidFill>
-                  <a:schemeClr val="tx1"/>
-                </a:solidFill>
-                <a:latin typeface="Arial" charset="0"/>
-                <a:ea typeface="ＭＳ Ｐゴシック" pitchFamily="-112" charset="-128"/>
-              </a:defRPr>
-            </a:lvl5pPr>
+            <a:lvl3pPr eaLnBrk="0" hangingPunct="0"/>
+            <a:lvl4pPr eaLnBrk="0" hangingPunct="0"/>
+            <a:lvl5pPr eaLnBrk="0" hangingPunct="0"/>
             <a:lvl6pPr marL="457200" eaLnBrk="0" fontAlgn="base" hangingPunct="0">
               <a:spcBef>
                 <a:spcPct val="0"/>
@@ -6186,13 +6394,6 @@
               <a:spcAft>
                 <a:spcPct val="0"/>
               </a:spcAft>
-              <a:defRPr sz="2000">
-                <a:solidFill>
-                  <a:schemeClr val="tx1"/>
-                </a:solidFill>
-                <a:latin typeface="Arial" charset="0"/>
-                <a:ea typeface="ＭＳ Ｐゴシック" pitchFamily="-112" charset="-128"/>
-              </a:defRPr>
             </a:lvl6pPr>
             <a:lvl7pPr marL="914400" eaLnBrk="0" fontAlgn="base" hangingPunct="0">
               <a:spcBef>
@@ -6201,13 +6402,6 @@
               <a:spcAft>
                 <a:spcPct val="0"/>
               </a:spcAft>
-              <a:defRPr sz="2000">
-                <a:solidFill>
-                  <a:schemeClr val="tx1"/>
-                </a:solidFill>
-                <a:latin typeface="Arial" charset="0"/>
-                <a:ea typeface="ＭＳ Ｐゴシック" pitchFamily="-112" charset="-128"/>
-              </a:defRPr>
             </a:lvl7pPr>
             <a:lvl8pPr marL="1371600" eaLnBrk="0" fontAlgn="base" hangingPunct="0">
               <a:spcBef>
@@ -6216,13 +6410,6 @@
               <a:spcAft>
                 <a:spcPct val="0"/>
               </a:spcAft>
-              <a:defRPr sz="2000">
-                <a:solidFill>
-                  <a:schemeClr val="tx1"/>
-                </a:solidFill>
-                <a:latin typeface="Arial" charset="0"/>
-                <a:ea typeface="ＭＳ Ｐゴシック" pitchFamily="-112" charset="-128"/>
-              </a:defRPr>
             </a:lvl8pPr>
             <a:lvl9pPr marL="1828800" eaLnBrk="0" fontAlgn="base" hangingPunct="0">
               <a:spcBef>
@@ -6231,39 +6418,70 @@
               <a:spcAft>
                 <a:spcPct val="0"/>
               </a:spcAft>
-              <a:defRPr sz="2000">
-                <a:solidFill>
-                  <a:schemeClr val="tx1"/>
-                </a:solidFill>
-                <a:latin typeface="Arial" charset="0"/>
-                <a:ea typeface="ＭＳ Ｐゴシック" pitchFamily="-112" charset="-128"/>
-              </a:defRPr>
             </a:lvl9pPr>
           </a:lstStyle>
           <a:p>
-            <a:pPr marL="0" indent="0" eaLnBrk="1" hangingPunct="1">
-              <a:spcBef>
-                <a:spcPct val="5000"/>
-              </a:spcBef>
-              <a:spcAft>
-                <a:spcPts val="1200"/>
-              </a:spcAft>
+            <a:pPr marL="0" indent="0">
+              <a:buNone/>
             </a:pPr>
             <a:r>
-              <a:rPr lang="en-US" altLang="en-US" sz="2800" dirty="0" smtClean="0"/>
-              <a:t>As the VDW and its processes mature and we turn to more sophisticated quality assurance investigations, it is crucial that we respond effectively to negative findings.  Just like our health care systems, we need to learn from our data.</a:t>
+              <a:rPr lang="en-US" altLang="en-US" dirty="0"/>
+              <a:t>Population-based research often requires drawing conclusions from data that isn’t there.  For example:</a:t>
             </a:r>
           </a:p>
           <a:p>
-            <a:pPr marL="0" indent="0" eaLnBrk="1" hangingPunct="1">
-              <a:spcBef>
-                <a:spcPct val="5000"/>
-              </a:spcBef>
+            <a:r>
+              <a:rPr lang="en-US" altLang="en-US" dirty="0"/>
+              <a:t>If this patient had ever had </a:t>
+            </a:r>
+            <a:r>
+              <a:rPr lang="en-US" altLang="en-US" dirty="0" err="1"/>
+              <a:t>phenothiazines</a:t>
+            </a:r>
+            <a:r>
+              <a:rPr lang="en-US" altLang="en-US" dirty="0"/>
+              <a:t>, we would have a record of it in our data.</a:t>
+            </a:r>
+          </a:p>
+          <a:p>
+            <a:r>
+              <a:rPr lang="en-US" altLang="en-US" dirty="0"/>
+              <a:t>She has no such record.</a:t>
+            </a:r>
+          </a:p>
+          <a:p>
+            <a:r>
+              <a:rPr lang="en-US" altLang="en-US" dirty="0"/>
+              <a:t>Therefore, she is a suitable control for our study of phenothiazine exposure.</a:t>
+            </a:r>
+          </a:p>
+          <a:p>
+            <a:r>
+              <a:rPr lang="en-US" altLang="en-US" dirty="0"/>
+              <a:t>These inferences are only valid if we </a:t>
+            </a:r>
+            <a:r>
+              <a:rPr lang="en-US" altLang="en-US" dirty="0" smtClean="0"/>
+              <a:t>know we have </a:t>
+            </a:r>
+            <a:r>
+              <a:rPr lang="en-US" altLang="en-US" dirty="0"/>
+              <a:t>complete data</a:t>
+            </a:r>
+            <a:r>
+              <a:rPr lang="en-US" altLang="en-US" dirty="0" smtClean="0"/>
+              <a:t>.</a:t>
+            </a:r>
+          </a:p>
+          <a:p>
+            <a:pPr marL="0" indent="0">
+              <a:buNone/>
             </a:pPr>
             <a:r>
-              <a:rPr lang="en-US" altLang="en-US" sz="2800" dirty="0" smtClean="0"/>
-              <a:t>The VDW Operations Committee was able to go from negative finding to new spec in something like six months, and actual implementations in less than a year.  For a large, increasingly divers and largely unfunded group, this is an excellent pace.</a:t>
+              <a:rPr lang="en-US" altLang="en-US" dirty="0" smtClean="0"/>
+              <a:t>We can either eliminate all people with problematic capture of any sort from VDW, or give studies the ability to tailor their samples to their needs.</a:t>
             </a:r>
+            <a:endParaRPr lang="en-US" altLang="en-US" dirty="0"/>
           </a:p>
         </p:txBody>
       </p:sp>
@@ -6277,8 +6495,8 @@
         </p:nvSpPr>
         <p:spPr bwMode="auto">
           <a:xfrm>
-            <a:off x="28117800" y="11844339"/>
-            <a:ext cx="7624763" cy="5529261"/>
+            <a:off x="28117800" y="13139739"/>
+            <a:ext cx="7624763" cy="4233861"/>
           </a:xfrm>
           <a:prstGeom prst="rect">
             <a:avLst/>
@@ -6310,51 +6528,36 @@
         <p:txBody>
           <a:bodyPr/>
           <a:lstStyle>
-            <a:lvl1pPr marL="228600" indent="-228600" eaLnBrk="0" hangingPunct="0">
-              <a:defRPr sz="2000">
-                <a:solidFill>
-                  <a:schemeClr val="tx1"/>
-                </a:solidFill>
-                <a:latin typeface="Arial" charset="0"/>
-                <a:ea typeface="ＭＳ Ｐゴシック" pitchFamily="-112" charset="-128"/>
+            <a:defPPr>
+              <a:defRPr lang="en-US"/>
+            </a:defPPr>
+            <a:lvl1pPr marL="457200" indent="-457200" eaLnBrk="1" hangingPunct="1">
+              <a:spcBef>
+                <a:spcPct val="5000"/>
+              </a:spcBef>
+              <a:buFont typeface="Arial" panose="020B0604020202020204" pitchFamily="34" charset="0"/>
+              <a:buChar char="•"/>
+              <a:defRPr sz="3200">
+                <a:latin typeface="Tahoma" panose="020B0604030504040204" pitchFamily="34" charset="0"/>
+                <a:ea typeface="Tahoma" panose="020B0604030504040204" pitchFamily="34" charset="0"/>
+                <a:cs typeface="Tahoma" panose="020B0604030504040204" pitchFamily="34" charset="0"/>
               </a:defRPr>
             </a:lvl1pPr>
-            <a:lvl2pPr marL="37931725" indent="-37474525" eaLnBrk="0" hangingPunct="0">
-              <a:defRPr sz="2000">
-                <a:solidFill>
-                  <a:schemeClr val="tx1"/>
-                </a:solidFill>
-                <a:latin typeface="Arial" charset="0"/>
-                <a:ea typeface="ＭＳ Ｐゴシック" pitchFamily="-112" charset="-128"/>
+            <a:lvl2pPr marL="796925" lvl="1" indent="-457200" defTabSz="274320" eaLnBrk="1" hangingPunct="1">
+              <a:spcBef>
+                <a:spcPct val="5000"/>
+              </a:spcBef>
+              <a:buFont typeface="Arial" panose="020B0604020202020204" pitchFamily="34" charset="0"/>
+              <a:buChar char="•"/>
+              <a:defRPr sz="3200">
+                <a:latin typeface="Tahoma" panose="020B0604030504040204" pitchFamily="34" charset="0"/>
+                <a:ea typeface="Tahoma" panose="020B0604030504040204" pitchFamily="34" charset="0"/>
+                <a:cs typeface="Tahoma" panose="020B0604030504040204" pitchFamily="34" charset="0"/>
               </a:defRPr>
             </a:lvl2pPr>
-            <a:lvl3pPr eaLnBrk="0" hangingPunct="0">
-              <a:defRPr sz="2000">
-                <a:solidFill>
-                  <a:schemeClr val="tx1"/>
-                </a:solidFill>
-                <a:latin typeface="Arial" charset="0"/>
-                <a:ea typeface="ＭＳ Ｐゴシック" pitchFamily="-112" charset="-128"/>
-              </a:defRPr>
-            </a:lvl3pPr>
-            <a:lvl4pPr eaLnBrk="0" hangingPunct="0">
-              <a:defRPr sz="2000">
-                <a:solidFill>
-                  <a:schemeClr val="tx1"/>
-                </a:solidFill>
-                <a:latin typeface="Arial" charset="0"/>
-                <a:ea typeface="ＭＳ Ｐゴシック" pitchFamily="-112" charset="-128"/>
-              </a:defRPr>
-            </a:lvl4pPr>
-            <a:lvl5pPr eaLnBrk="0" hangingPunct="0">
-              <a:defRPr sz="2000">
-                <a:solidFill>
-                  <a:schemeClr val="tx1"/>
-                </a:solidFill>
-                <a:latin typeface="Arial" charset="0"/>
-                <a:ea typeface="ＭＳ Ｐゴシック" pitchFamily="-112" charset="-128"/>
-              </a:defRPr>
-            </a:lvl5pPr>
+            <a:lvl3pPr eaLnBrk="0" hangingPunct="0"/>
+            <a:lvl4pPr eaLnBrk="0" hangingPunct="0"/>
+            <a:lvl5pPr eaLnBrk="0" hangingPunct="0"/>
             <a:lvl6pPr marL="457200" eaLnBrk="0" fontAlgn="base" hangingPunct="0">
               <a:spcBef>
                 <a:spcPct val="0"/>
@@ -6362,13 +6565,6 @@
               <a:spcAft>
                 <a:spcPct val="0"/>
               </a:spcAft>
-              <a:defRPr sz="2000">
-                <a:solidFill>
-                  <a:schemeClr val="tx1"/>
-                </a:solidFill>
-                <a:latin typeface="Arial" charset="0"/>
-                <a:ea typeface="ＭＳ Ｐゴシック" pitchFamily="-112" charset="-128"/>
-              </a:defRPr>
             </a:lvl6pPr>
             <a:lvl7pPr marL="914400" eaLnBrk="0" fontAlgn="base" hangingPunct="0">
               <a:spcBef>
@@ -6377,13 +6573,6 @@
               <a:spcAft>
                 <a:spcPct val="0"/>
               </a:spcAft>
-              <a:defRPr sz="2000">
-                <a:solidFill>
-                  <a:schemeClr val="tx1"/>
-                </a:solidFill>
-                <a:latin typeface="Arial" charset="0"/>
-                <a:ea typeface="ＭＳ Ｐゴシック" pitchFamily="-112" charset="-128"/>
-              </a:defRPr>
             </a:lvl7pPr>
             <a:lvl8pPr marL="1371600" eaLnBrk="0" fontAlgn="base" hangingPunct="0">
               <a:spcBef>
@@ -6392,13 +6581,6 @@
               <a:spcAft>
                 <a:spcPct val="0"/>
               </a:spcAft>
-              <a:defRPr sz="2000">
-                <a:solidFill>
-                  <a:schemeClr val="tx1"/>
-                </a:solidFill>
-                <a:latin typeface="Arial" charset="0"/>
-                <a:ea typeface="ＭＳ Ｐゴシック" pitchFamily="-112" charset="-128"/>
-              </a:defRPr>
             </a:lvl8pPr>
             <a:lvl9pPr marL="1828800" eaLnBrk="0" fontAlgn="base" hangingPunct="0">
               <a:spcBef>
@@ -6407,60 +6589,30 @@
               <a:spcAft>
                 <a:spcPct val="0"/>
               </a:spcAft>
-              <a:defRPr sz="2000">
-                <a:solidFill>
-                  <a:schemeClr val="tx1"/>
-                </a:solidFill>
-                <a:latin typeface="Arial" charset="0"/>
-                <a:ea typeface="ＭＳ Ｐゴシック" pitchFamily="-112" charset="-128"/>
-              </a:defRPr>
             </a:lvl9pPr>
           </a:lstStyle>
           <a:p>
-            <a:pPr marL="0" indent="0" eaLnBrk="1" hangingPunct="1">
-              <a:spcBef>
-                <a:spcPct val="5000"/>
-              </a:spcBef>
-              <a:spcAft>
-                <a:spcPts val="1200"/>
-              </a:spcAft>
-            </a:pPr>
             <a:r>
-              <a:rPr lang="en-US" altLang="en-US" sz="2800" dirty="0"/>
-              <a:t>On balance, the new flags stand to improve the quality of data-based research in the </a:t>
+              <a:rPr lang="en-US" altLang="en-US" dirty="0"/>
+              <a:t>Just like our health systems, VDW needs to be a "learning" system, and adapt to negative findings.</a:t>
+            </a:r>
+          </a:p>
+          <a:p>
+            <a:r>
+              <a:rPr lang="en-US" altLang="en-US" dirty="0"/>
+              <a:t>In this case, we went from finding to new spec in 9 months, and to workable implementations in 12</a:t>
             </a:r>
             <a:r>
-              <a:rPr lang="en-US" altLang="en-US" sz="2800" dirty="0" smtClean="0"/>
-              <a:t>HCSRN.  Projects </a:t>
-            </a:r>
-            <a:r>
-              <a:rPr lang="en-US" altLang="en-US" sz="2800" dirty="0"/>
-              <a:t>needing to define populations-at-risk of exposure to particular pharmacy fills, tumors, or lab result values, for example, would do well to use the new flags to screen out people </a:t>
-            </a:r>
-            <a:r>
-              <a:rPr lang="en-US" altLang="en-US" sz="2800" dirty="0" smtClean="0"/>
-              <a:t>whose exposures may </a:t>
-            </a:r>
-            <a:r>
-              <a:rPr lang="en-US" altLang="en-US" sz="2800" dirty="0"/>
-              <a:t>not be completely captured</a:t>
-            </a:r>
-            <a:r>
-              <a:rPr lang="en-US" altLang="en-US" sz="2800" dirty="0" smtClean="0"/>
+              <a:rPr lang="en-US" altLang="en-US" dirty="0" smtClean="0"/>
               <a:t>.</a:t>
             </a:r>
           </a:p>
           <a:p>
-            <a:pPr marL="0" indent="0" eaLnBrk="1" hangingPunct="1">
-              <a:spcBef>
-                <a:spcPct val="5000"/>
-              </a:spcBef>
-            </a:pPr>
             <a:r>
-              <a:rPr lang="en-US" altLang="en-US" sz="2800" dirty="0" smtClean="0"/>
-              <a:t>The Enrollment/</a:t>
+              <a:rPr lang="en-US" altLang="en-US" dirty="0" smtClean="0"/>
+              <a:t>While there is considerable variation in implementation quality, the new variables are demonstrably better than the old single-flag approach.</a:t>
             </a:r>
-            <a:endParaRPr lang="en-US" altLang="en-US" sz="2800" dirty="0"/>
+            <a:endParaRPr lang="en-US" altLang="en-US" dirty="0"/>
           </a:p>
         </p:txBody>
       </p:sp>
@@ -6485,7 +6637,7 @@
         </p:blipFill>
         <p:spPr bwMode="auto">
           <a:xfrm>
-            <a:off x="17640617" y="4742683"/>
+            <a:off x="17621409" y="4742683"/>
             <a:ext cx="4534221" cy="2743583"/>
           </a:xfrm>
           <a:prstGeom prst="rect">
@@ -6518,7 +6670,7 @@
         </p:blipFill>
         <p:spPr bwMode="auto">
           <a:xfrm>
-            <a:off x="17602200" y="9061563"/>
+            <a:off x="17602519" y="9061563"/>
             <a:ext cx="4572000" cy="2696631"/>
           </a:xfrm>
           <a:prstGeom prst="rect">
@@ -6584,7 +6736,7 @@
         </p:blipFill>
         <p:spPr bwMode="auto">
           <a:xfrm>
-            <a:off x="22627337" y="4750303"/>
+            <a:off x="22627018" y="4742683"/>
             <a:ext cx="4533901" cy="2735963"/>
           </a:xfrm>
           <a:prstGeom prst="rect">
@@ -6617,7 +6769,7 @@
         </p:blipFill>
         <p:spPr bwMode="auto">
           <a:xfrm>
-            <a:off x="22627336" y="13442566"/>
+            <a:off x="22627018" y="13675309"/>
             <a:ext cx="4533901" cy="2743583"/>
           </a:xfrm>
           <a:prstGeom prst="rect">
@@ -6639,7 +6791,7 @@
         </p:nvSpPr>
         <p:spPr bwMode="auto">
           <a:xfrm>
-            <a:off x="9067801" y="10190163"/>
+            <a:off x="9067801" y="9372600"/>
             <a:ext cx="7624762" cy="762000"/>
           </a:xfrm>
           <a:prstGeom prst="rect">
@@ -6782,6 +6934,9 @@
                 <a:solidFill>
                   <a:schemeClr val="bg1"/>
                 </a:solidFill>
+                <a:latin typeface="Tahoma" panose="020B0604030504040204" pitchFamily="34" charset="0"/>
+                <a:ea typeface="Tahoma" panose="020B0604030504040204" pitchFamily="34" charset="0"/>
+                <a:cs typeface="Tahoma" panose="020B0604030504040204" pitchFamily="34" charset="0"/>
               </a:rPr>
               <a:t>Evaluation Method</a:t>
             </a:r>
@@ -6789,6 +6944,9 @@
               <a:solidFill>
                 <a:schemeClr val="bg1"/>
               </a:solidFill>
+              <a:latin typeface="Tahoma" panose="020B0604030504040204" pitchFamily="34" charset="0"/>
+              <a:ea typeface="Tahoma" panose="020B0604030504040204" pitchFamily="34" charset="0"/>
+              <a:cs typeface="Tahoma" panose="020B0604030504040204" pitchFamily="34" charset="0"/>
             </a:endParaRPr>
           </a:p>
         </p:txBody>
@@ -6814,7 +6972,7 @@
         </p:blipFill>
         <p:spPr bwMode="auto">
           <a:xfrm>
-            <a:off x="17602200" y="13442566"/>
+            <a:off x="17602519" y="13675309"/>
             <a:ext cx="4572000" cy="2743583"/>
           </a:xfrm>
           <a:prstGeom prst="rect">
@@ -6836,8 +6994,8 @@
         </p:nvSpPr>
         <p:spPr bwMode="auto">
           <a:xfrm>
-            <a:off x="9067800" y="11102975"/>
-            <a:ext cx="7624763" cy="6956425"/>
+            <a:off x="9067800" y="10285412"/>
+            <a:ext cx="7624763" cy="1604137"/>
           </a:xfrm>
           <a:prstGeom prst="rect">
             <a:avLst/>
@@ -6976,87 +7134,1102 @@
             </a:lvl9pPr>
           </a:lstStyle>
           <a:p>
-            <a:pPr marL="0" indent="0" eaLnBrk="1" hangingPunct="1">
+            <a:pPr marL="457200" indent="-457200" eaLnBrk="1" hangingPunct="1">
               <a:spcBef>
                 <a:spcPts val="0"/>
               </a:spcBef>
               <a:spcAft>
                 <a:spcPts val="1200"/>
               </a:spcAft>
+              <a:buFont typeface="Arial" panose="020B0604020202020204" pitchFamily="34" charset="0"/>
+              <a:buChar char="•"/>
             </a:pPr>
             <a:r>
-              <a:rPr lang="en-US" altLang="en-US" sz="2800" dirty="0" smtClean="0"/>
-              <a:t>After </a:t>
+              <a:rPr lang="en-US" altLang="en-US" sz="3200" dirty="0">
+                <a:latin typeface="Tahoma" panose="020B0604030504040204" pitchFamily="34" charset="0"/>
+                <a:ea typeface="Tahoma" panose="020B0604030504040204" pitchFamily="34" charset="0"/>
+                <a:cs typeface="Tahoma" panose="020B0604030504040204" pitchFamily="34" charset="0"/>
+              </a:rPr>
+              <a:t>Calculate </a:t>
             </a:r>
             <a:r>
-              <a:rPr lang="en-US" altLang="en-US" sz="2800" dirty="0" smtClean="0"/>
-              <a:t>numerous HCSRN sites implemented </a:t>
+              <a:rPr lang="en-US" altLang="en-US" sz="3200" b="1" dirty="0">
+                <a:latin typeface="Tahoma" panose="020B0604030504040204" pitchFamily="34" charset="0"/>
+                <a:ea typeface="Tahoma" panose="020B0604030504040204" pitchFamily="34" charset="0"/>
+                <a:cs typeface="Tahoma" panose="020B0604030504040204" pitchFamily="34" charset="0"/>
+              </a:rPr>
+              <a:t>monthly</a:t>
             </a:r>
             <a:r>
-              <a:rPr lang="en-US" altLang="en-US" sz="2800" dirty="0" smtClean="0"/>
-              <a:t>these </a:t>
+              <a:rPr lang="en-US" altLang="en-US" sz="3200" dirty="0">
+                <a:latin typeface="Tahoma" panose="020B0604030504040204" pitchFamily="34" charset="0"/>
+                <a:ea typeface="Tahoma" panose="020B0604030504040204" pitchFamily="34" charset="0"/>
+                <a:cs typeface="Tahoma" panose="020B0604030504040204" pitchFamily="34" charset="0"/>
+              </a:rPr>
+              <a:t> per-person </a:t>
             </a:r>
             <a:r>
-              <a:rPr lang="en-US" altLang="en-US" sz="2800" dirty="0" smtClean="0"/>
-              <a:t>flags, the Enrollment workgroup put out an evaluation program which calculated </a:t>
+              <a:rPr lang="en-US" altLang="en-US" sz="3200" b="1" dirty="0">
+                <a:latin typeface="Tahoma" panose="020B0604030504040204" pitchFamily="34" charset="0"/>
+                <a:ea typeface="Tahoma" panose="020B0604030504040204" pitchFamily="34" charset="0"/>
+                <a:cs typeface="Tahoma" panose="020B0604030504040204" pitchFamily="34" charset="0"/>
+              </a:rPr>
+              <a:t>rates</a:t>
             </a:r>
             <a:r>
-              <a:rPr lang="en-US" altLang="en-US" sz="2800" b="1" dirty="0" smtClean="0"/>
-              <a:t>monthly per-member rates</a:t>
+              <a:rPr lang="en-US" altLang="en-US" sz="3200" dirty="0">
+                <a:latin typeface="Tahoma" panose="020B0604030504040204" pitchFamily="34" charset="0"/>
+                <a:ea typeface="Tahoma" panose="020B0604030504040204" pitchFamily="34" charset="0"/>
+                <a:cs typeface="Tahoma" panose="020B0604030504040204" pitchFamily="34" charset="0"/>
+              </a:rPr>
+              <a:t> of relevant data records, broken out by the </a:t>
             </a:r>
             <a:r>
-              <a:rPr lang="en-US" altLang="en-US" sz="2800" dirty="0" smtClean="0"/>
-              <a:t> of the number of relevant records (e.g., lab results for </a:t>
+              <a:rPr lang="en-US" altLang="en-US" sz="3200" dirty="0" smtClean="0">
+                <a:latin typeface="Tahoma" panose="020B0604030504040204" pitchFamily="34" charset="0"/>
+                <a:ea typeface="Tahoma" panose="020B0604030504040204" pitchFamily="34" charset="0"/>
+                <a:cs typeface="Tahoma" panose="020B0604030504040204" pitchFamily="34" charset="0"/>
+              </a:rPr>
+              <a:t>whether capture is</a:t>
             </a:r>
             <a:r>
-              <a:rPr lang="en-US" altLang="en-US" sz="2800" dirty="0" err="1" smtClean="0"/>
-              <a:t>incomplete_lab</a:t>
+              <a:rPr lang="en-US" altLang="en-US" sz="3200" b="1" dirty="0" smtClean="0">
+                <a:latin typeface="Tahoma" panose="020B0604030504040204" pitchFamily="34" charset="0"/>
+                <a:ea typeface="Tahoma" panose="020B0604030504040204" pitchFamily="34" charset="0"/>
+                <a:cs typeface="Tahoma" panose="020B0604030504040204" pitchFamily="34" charset="0"/>
+              </a:rPr>
+              <a:t> suspected incomplete</a:t>
             </a:r>
             <a:r>
-              <a:rPr lang="en-US" altLang="en-US" sz="2800" dirty="0" smtClean="0"/>
-              <a:t>) for each value of each flag.</a:t>
+              <a:rPr lang="en-US" altLang="en-US" sz="3200" dirty="0" smtClean="0">
+                <a:latin typeface="Tahoma" panose="020B0604030504040204" pitchFamily="34" charset="0"/>
+                <a:ea typeface="Tahoma" panose="020B0604030504040204" pitchFamily="34" charset="0"/>
+                <a:cs typeface="Tahoma" panose="020B0604030504040204" pitchFamily="34" charset="0"/>
+              </a:rPr>
+              <a:t> (SI) or </a:t>
+            </a:r>
+            <a:r>
+              <a:rPr lang="en-US" altLang="en-US" sz="3200" b="1" dirty="0" smtClean="0">
+                <a:latin typeface="Tahoma" panose="020B0604030504040204" pitchFamily="34" charset="0"/>
+                <a:ea typeface="Tahoma" panose="020B0604030504040204" pitchFamily="34" charset="0"/>
+                <a:cs typeface="Tahoma" panose="020B0604030504040204" pitchFamily="34" charset="0"/>
+              </a:rPr>
+              <a:t>not suspected incomplete</a:t>
+            </a:r>
+            <a:r>
+              <a:rPr lang="en-US" altLang="en-US" sz="3200" dirty="0" smtClean="0">
+                <a:latin typeface="Tahoma" panose="020B0604030504040204" pitchFamily="34" charset="0"/>
+                <a:ea typeface="Tahoma" panose="020B0604030504040204" pitchFamily="34" charset="0"/>
+                <a:cs typeface="Tahoma" panose="020B0604030504040204" pitchFamily="34" charset="0"/>
+              </a:rPr>
+              <a:t> (NSI).  For example:</a:t>
+            </a:r>
+            <a:endParaRPr lang="en-US" altLang="en-US" sz="3200" dirty="0" smtClean="0">
+              <a:latin typeface="Tahoma" panose="020B0604030504040204" pitchFamily="34" charset="0"/>
+              <a:ea typeface="Tahoma" panose="020B0604030504040204" pitchFamily="34" charset="0"/>
+              <a:cs typeface="Tahoma" panose="020B0604030504040204" pitchFamily="34" charset="0"/>
+            </a:endParaRPr>
+          </a:p>
+        </p:txBody>
+      </p:sp>
+      <p:sp>
+        <p:nvSpPr>
+          <p:cNvPr id="3" name="TextBox 2"/>
+          <p:cNvSpPr txBox="1"/>
+          <p:nvPr/>
+        </p:nvSpPr>
+        <p:spPr>
+          <a:xfrm>
+            <a:off x="18936977" y="4114800"/>
+            <a:ext cx="1973617" cy="523220"/>
+          </a:xfrm>
+          <a:prstGeom prst="rect">
+            <a:avLst/>
+          </a:prstGeom>
+          <a:noFill/>
+        </p:spPr>
+        <p:txBody>
+          <a:bodyPr wrap="none" rtlCol="0">
+            <a:spAutoFit/>
+          </a:bodyPr>
+          <a:lstStyle/>
+          <a:p>
+            <a:r>
+              <a:rPr lang="en-US" sz="2800" b="1" dirty="0" smtClean="0">
+                <a:latin typeface="Tahoma" panose="020B0604030504040204" pitchFamily="34" charset="0"/>
+                <a:ea typeface="Tahoma" panose="020B0604030504040204" pitchFamily="34" charset="0"/>
+                <a:cs typeface="Tahoma" panose="020B0604030504040204" pitchFamily="34" charset="0"/>
+              </a:rPr>
+              <a:t>Pharmacy</a:t>
+            </a:r>
+            <a:endParaRPr lang="en-US" sz="2800" b="1" dirty="0">
+              <a:latin typeface="Tahoma" panose="020B0604030504040204" pitchFamily="34" charset="0"/>
+              <a:ea typeface="Tahoma" panose="020B0604030504040204" pitchFamily="34" charset="0"/>
+              <a:cs typeface="Tahoma" panose="020B0604030504040204" pitchFamily="34" charset="0"/>
+            </a:endParaRPr>
+          </a:p>
+        </p:txBody>
+      </p:sp>
+      <p:sp>
+        <p:nvSpPr>
+          <p:cNvPr id="39" name="TextBox 38"/>
+          <p:cNvSpPr txBox="1"/>
+          <p:nvPr/>
+        </p:nvSpPr>
+        <p:spPr>
+          <a:xfrm>
+            <a:off x="24256325" y="4114800"/>
+            <a:ext cx="1353256" cy="523220"/>
+          </a:xfrm>
+          <a:prstGeom prst="rect">
+            <a:avLst/>
+          </a:prstGeom>
+          <a:noFill/>
+        </p:spPr>
+        <p:txBody>
+          <a:bodyPr wrap="none" rtlCol="0">
+            <a:spAutoFit/>
+          </a:bodyPr>
+          <a:lstStyle/>
+          <a:p>
+            <a:r>
+              <a:rPr lang="en-US" sz="2800" b="1" dirty="0" smtClean="0">
+                <a:latin typeface="Tahoma" panose="020B0604030504040204" pitchFamily="34" charset="0"/>
+                <a:ea typeface="Tahoma" panose="020B0604030504040204" pitchFamily="34" charset="0"/>
+                <a:cs typeface="Tahoma" panose="020B0604030504040204" pitchFamily="34" charset="0"/>
+              </a:rPr>
+              <a:t>Tumor</a:t>
+            </a:r>
+          </a:p>
+        </p:txBody>
+      </p:sp>
+      <p:sp>
+        <p:nvSpPr>
+          <p:cNvPr id="53" name="TextBox 52"/>
+          <p:cNvSpPr txBox="1"/>
+          <p:nvPr/>
+        </p:nvSpPr>
+        <p:spPr>
+          <a:xfrm>
+            <a:off x="22863605" y="13168235"/>
+            <a:ext cx="4256293" cy="523220"/>
+          </a:xfrm>
+          <a:prstGeom prst="rect">
+            <a:avLst/>
+          </a:prstGeom>
+          <a:noFill/>
+        </p:spPr>
+        <p:txBody>
+          <a:bodyPr wrap="none" rtlCol="0">
+            <a:spAutoFit/>
+          </a:bodyPr>
+          <a:lstStyle/>
+          <a:p>
+            <a:r>
+              <a:rPr lang="en-US" sz="2800" b="1" dirty="0" smtClean="0">
+                <a:latin typeface="Tahoma" panose="020B0604030504040204" pitchFamily="34" charset="0"/>
+                <a:ea typeface="Tahoma" panose="020B0604030504040204" pitchFamily="34" charset="0"/>
+                <a:cs typeface="Tahoma" panose="020B0604030504040204" pitchFamily="34" charset="0"/>
+              </a:rPr>
+              <a:t>Outpatient Encounters</a:t>
+            </a:r>
+          </a:p>
+        </p:txBody>
+      </p:sp>
+      <p:sp>
+        <p:nvSpPr>
+          <p:cNvPr id="54" name="TextBox 53"/>
+          <p:cNvSpPr txBox="1"/>
+          <p:nvPr/>
+        </p:nvSpPr>
+        <p:spPr>
+          <a:xfrm>
+            <a:off x="18516990" y="13152089"/>
+            <a:ext cx="2965877" cy="523220"/>
+          </a:xfrm>
+          <a:prstGeom prst="rect">
+            <a:avLst/>
+          </a:prstGeom>
+          <a:noFill/>
+        </p:spPr>
+        <p:txBody>
+          <a:bodyPr wrap="none" rtlCol="0">
+            <a:spAutoFit/>
+          </a:bodyPr>
+          <a:lstStyle/>
+          <a:p>
+            <a:r>
+              <a:rPr lang="en-US" sz="2800" b="1" dirty="0" smtClean="0">
+                <a:latin typeface="Tahoma" panose="020B0604030504040204" pitchFamily="34" charset="0"/>
+                <a:ea typeface="Tahoma" panose="020B0604030504040204" pitchFamily="34" charset="0"/>
+                <a:cs typeface="Tahoma" panose="020B0604030504040204" pitchFamily="34" charset="0"/>
+              </a:rPr>
+              <a:t>Inpatient Stays</a:t>
+            </a:r>
+          </a:p>
+        </p:txBody>
+      </p:sp>
+      <p:sp>
+        <p:nvSpPr>
+          <p:cNvPr id="55" name="TextBox 54"/>
+          <p:cNvSpPr txBox="1"/>
+          <p:nvPr/>
+        </p:nvSpPr>
+        <p:spPr>
+          <a:xfrm>
+            <a:off x="18776676" y="8502303"/>
+            <a:ext cx="2268570" cy="523220"/>
+          </a:xfrm>
+          <a:prstGeom prst="rect">
+            <a:avLst/>
+          </a:prstGeom>
+          <a:noFill/>
+        </p:spPr>
+        <p:txBody>
+          <a:bodyPr wrap="none" rtlCol="0">
+            <a:spAutoFit/>
+          </a:bodyPr>
+          <a:lstStyle/>
+          <a:p>
+            <a:r>
+              <a:rPr lang="en-US" sz="2800" b="1" dirty="0" smtClean="0">
+                <a:latin typeface="Tahoma" panose="020B0604030504040204" pitchFamily="34" charset="0"/>
+                <a:ea typeface="Tahoma" panose="020B0604030504040204" pitchFamily="34" charset="0"/>
+                <a:cs typeface="Tahoma" panose="020B0604030504040204" pitchFamily="34" charset="0"/>
+              </a:rPr>
+              <a:t>Lab Results</a:t>
+            </a:r>
+          </a:p>
+        </p:txBody>
+      </p:sp>
+      <p:sp>
+        <p:nvSpPr>
+          <p:cNvPr id="56" name="TextBox 55"/>
+          <p:cNvSpPr txBox="1"/>
+          <p:nvPr/>
+        </p:nvSpPr>
+        <p:spPr>
+          <a:xfrm>
+            <a:off x="23962463" y="8502303"/>
+            <a:ext cx="1944763" cy="523220"/>
+          </a:xfrm>
+          <a:prstGeom prst="rect">
+            <a:avLst/>
+          </a:prstGeom>
+          <a:noFill/>
+        </p:spPr>
+        <p:txBody>
+          <a:bodyPr wrap="none" rtlCol="0">
+            <a:spAutoFit/>
+          </a:bodyPr>
+          <a:lstStyle/>
+          <a:p>
+            <a:r>
+              <a:rPr lang="en-US" sz="2800" b="1" dirty="0" smtClean="0">
+                <a:latin typeface="Tahoma" panose="020B0604030504040204" pitchFamily="34" charset="0"/>
+                <a:ea typeface="Tahoma" panose="020B0604030504040204" pitchFamily="34" charset="0"/>
+                <a:cs typeface="Tahoma" panose="020B0604030504040204" pitchFamily="34" charset="0"/>
+              </a:rPr>
+              <a:t>EMR Data</a:t>
+            </a:r>
+          </a:p>
+        </p:txBody>
+      </p:sp>
+      <p:graphicFrame>
+        <p:nvGraphicFramePr>
+          <p:cNvPr id="57" name="Table 56"/>
+          <p:cNvGraphicFramePr>
+            <a:graphicFrameLocks noGrp="1"/>
+          </p:cNvGraphicFramePr>
+          <p:nvPr>
+            <p:extLst>
+              <p:ext uri="{D42A27DB-BD31-4B8C-83A1-F6EECF244321}">
+                <p14:modId xmlns:p14="http://schemas.microsoft.com/office/powerpoint/2010/main" val="436756177"/>
+              </p:ext>
+            </p:extLst>
+          </p:nvPr>
+        </p:nvGraphicFramePr>
+        <p:xfrm>
+          <a:off x="9167814" y="12954000"/>
+          <a:ext cx="7748586" cy="2895600"/>
+        </p:xfrm>
+        <a:graphic>
+          <a:graphicData uri="http://schemas.openxmlformats.org/drawingml/2006/table">
+            <a:tbl>
+              <a:tblPr firstRow="1" bandRow="1">
+                <a:tableStyleId>{5C22544A-7EE6-4342-B048-85BDC9FD1C3A}</a:tableStyleId>
+              </a:tblPr>
+              <a:tblGrid>
+                <a:gridCol w="1576386"/>
+                <a:gridCol w="1676400"/>
+                <a:gridCol w="1571805"/>
+                <a:gridCol w="1535097"/>
+                <a:gridCol w="1388898"/>
+              </a:tblGrid>
+              <a:tr h="579120">
+                <a:tc>
+                  <a:txBody>
+                    <a:bodyPr/>
+                    <a:lstStyle/>
+                    <a:p>
+                      <a:r>
+                        <a:rPr lang="en-US" sz="2400" dirty="0" smtClean="0">
+                          <a:latin typeface="Arial" panose="020B0604020202020204" pitchFamily="34" charset="0"/>
+                          <a:cs typeface="Arial" panose="020B0604020202020204" pitchFamily="34" charset="0"/>
+                        </a:rPr>
+                        <a:t>Month</a:t>
+                      </a:r>
+                      <a:endParaRPr lang="en-US" sz="2400" dirty="0">
+                        <a:latin typeface="Arial" panose="020B0604020202020204" pitchFamily="34" charset="0"/>
+                        <a:cs typeface="Arial" panose="020B0604020202020204" pitchFamily="34" charset="0"/>
+                      </a:endParaRPr>
+                    </a:p>
+                  </a:txBody>
+                  <a:tcPr/>
+                </a:tc>
+                <a:tc>
+                  <a:txBody>
+                    <a:bodyPr/>
+                    <a:lstStyle/>
+                    <a:p>
+                      <a:r>
+                        <a:rPr lang="en-US" sz="2400" dirty="0" smtClean="0">
+                          <a:latin typeface="Arial" panose="020B0604020202020204" pitchFamily="34" charset="0"/>
+                          <a:cs typeface="Arial" panose="020B0604020202020204" pitchFamily="34" charset="0"/>
+                        </a:rPr>
+                        <a:t>Rx Flag</a:t>
+                      </a:r>
+                      <a:endParaRPr lang="en-US" sz="2400" dirty="0">
+                        <a:latin typeface="Arial" panose="020B0604020202020204" pitchFamily="34" charset="0"/>
+                        <a:cs typeface="Arial" panose="020B0604020202020204" pitchFamily="34" charset="0"/>
+                      </a:endParaRPr>
+                    </a:p>
+                  </a:txBody>
+                  <a:tcPr/>
+                </a:tc>
+                <a:tc>
+                  <a:txBody>
+                    <a:bodyPr/>
+                    <a:lstStyle/>
+                    <a:p>
+                      <a:r>
+                        <a:rPr lang="en-US" sz="2400" dirty="0" smtClean="0">
+                          <a:latin typeface="Arial" panose="020B0604020202020204" pitchFamily="34" charset="0"/>
+                          <a:cs typeface="Arial" panose="020B0604020202020204" pitchFamily="34" charset="0"/>
+                        </a:rPr>
+                        <a:t>N </a:t>
+                      </a:r>
+                      <a:r>
+                        <a:rPr lang="en-US" sz="2400" dirty="0" smtClean="0">
+                          <a:latin typeface="Arial" panose="020B0604020202020204" pitchFamily="34" charset="0"/>
+                          <a:cs typeface="Arial" panose="020B0604020202020204" pitchFamily="34" charset="0"/>
+                        </a:rPr>
+                        <a:t>People</a:t>
+                      </a:r>
+                      <a:endParaRPr lang="en-US" sz="2400" dirty="0">
+                        <a:latin typeface="Arial" panose="020B0604020202020204" pitchFamily="34" charset="0"/>
+                        <a:cs typeface="Arial" panose="020B0604020202020204" pitchFamily="34" charset="0"/>
+                      </a:endParaRPr>
+                    </a:p>
+                  </a:txBody>
+                  <a:tcPr/>
+                </a:tc>
+                <a:tc>
+                  <a:txBody>
+                    <a:bodyPr/>
+                    <a:lstStyle/>
+                    <a:p>
+                      <a:r>
+                        <a:rPr lang="en-US" sz="2400" dirty="0" smtClean="0">
+                          <a:latin typeface="Arial" panose="020B0604020202020204" pitchFamily="34" charset="0"/>
+                          <a:cs typeface="Arial" panose="020B0604020202020204" pitchFamily="34" charset="0"/>
+                        </a:rPr>
+                        <a:t>N </a:t>
+                      </a:r>
+                      <a:r>
+                        <a:rPr lang="en-US" sz="2400" dirty="0" smtClean="0">
+                          <a:latin typeface="Arial" panose="020B0604020202020204" pitchFamily="34" charset="0"/>
+                          <a:cs typeface="Arial" panose="020B0604020202020204" pitchFamily="34" charset="0"/>
+                        </a:rPr>
+                        <a:t>Fills</a:t>
+                      </a:r>
+                      <a:endParaRPr lang="en-US" sz="2400" dirty="0">
+                        <a:latin typeface="Arial" panose="020B0604020202020204" pitchFamily="34" charset="0"/>
+                        <a:cs typeface="Arial" panose="020B0604020202020204" pitchFamily="34" charset="0"/>
+                      </a:endParaRPr>
+                    </a:p>
+                  </a:txBody>
+                  <a:tcPr/>
+                </a:tc>
+                <a:tc>
+                  <a:txBody>
+                    <a:bodyPr/>
+                    <a:lstStyle/>
+                    <a:p>
+                      <a:r>
+                        <a:rPr lang="en-US" sz="2400" dirty="0" smtClean="0">
+                          <a:latin typeface="Arial" panose="020B0604020202020204" pitchFamily="34" charset="0"/>
+                          <a:cs typeface="Arial" panose="020B0604020202020204" pitchFamily="34" charset="0"/>
+                        </a:rPr>
+                        <a:t>Rate</a:t>
+                      </a:r>
+                      <a:endParaRPr lang="en-US" sz="2400" dirty="0">
+                        <a:latin typeface="Arial" panose="020B0604020202020204" pitchFamily="34" charset="0"/>
+                        <a:cs typeface="Arial" panose="020B0604020202020204" pitchFamily="34" charset="0"/>
+                      </a:endParaRPr>
+                    </a:p>
+                  </a:txBody>
+                  <a:tcPr/>
+                </a:tc>
+              </a:tr>
+              <a:tr h="579120">
+                <a:tc>
+                  <a:txBody>
+                    <a:bodyPr/>
+                    <a:lstStyle/>
+                    <a:p>
+                      <a:r>
+                        <a:rPr lang="en-US" sz="2200" dirty="0" smtClean="0">
+                          <a:latin typeface="Arial" panose="020B0604020202020204" pitchFamily="34" charset="0"/>
+                          <a:cs typeface="Arial" panose="020B0604020202020204" pitchFamily="34" charset="0"/>
+                        </a:rPr>
+                        <a:t>April 2013</a:t>
+                      </a:r>
+                      <a:endParaRPr lang="en-US" sz="2200" dirty="0">
+                        <a:latin typeface="Arial" panose="020B0604020202020204" pitchFamily="34" charset="0"/>
+                        <a:cs typeface="Arial" panose="020B0604020202020204" pitchFamily="34" charset="0"/>
+                      </a:endParaRPr>
+                    </a:p>
+                  </a:txBody>
+                  <a:tcPr/>
+                </a:tc>
+                <a:tc>
+                  <a:txBody>
+                    <a:bodyPr/>
+                    <a:lstStyle/>
+                    <a:p>
+                      <a:r>
+                        <a:rPr lang="en-US" sz="2200" dirty="0" smtClean="0">
+                          <a:latin typeface="Arial" panose="020B0604020202020204" pitchFamily="34" charset="0"/>
+                          <a:cs typeface="Arial" panose="020B0604020202020204" pitchFamily="34" charset="0"/>
+                        </a:rPr>
+                        <a:t>SI</a:t>
+                      </a:r>
+                      <a:endParaRPr lang="en-US" sz="2200" dirty="0">
+                        <a:latin typeface="Arial" panose="020B0604020202020204" pitchFamily="34" charset="0"/>
+                        <a:cs typeface="Arial" panose="020B0604020202020204" pitchFamily="34" charset="0"/>
+                      </a:endParaRPr>
+                    </a:p>
+                  </a:txBody>
+                  <a:tcPr/>
+                </a:tc>
+                <a:tc>
+                  <a:txBody>
+                    <a:bodyPr/>
+                    <a:lstStyle/>
+                    <a:p>
+                      <a:pPr algn="r"/>
+                      <a:r>
+                        <a:rPr lang="en-US" sz="2200" dirty="0" smtClean="0">
+                          <a:latin typeface="Consolas" panose="020B0609020204030204" pitchFamily="49" charset="0"/>
+                          <a:cs typeface="Consolas" panose="020B0609020204030204" pitchFamily="49" charset="0"/>
+                        </a:rPr>
+                        <a:t>44,556</a:t>
+                      </a:r>
+                      <a:endParaRPr lang="en-US" sz="2200" dirty="0">
+                        <a:latin typeface="Consolas" panose="020B0609020204030204" pitchFamily="49" charset="0"/>
+                        <a:cs typeface="Consolas" panose="020B0609020204030204" pitchFamily="49" charset="0"/>
+                      </a:endParaRPr>
+                    </a:p>
+                  </a:txBody>
+                  <a:tcPr/>
+                </a:tc>
+                <a:tc>
+                  <a:txBody>
+                    <a:bodyPr/>
+                    <a:lstStyle/>
+                    <a:p>
+                      <a:pPr algn="r"/>
+                      <a:r>
+                        <a:rPr lang="en-US" sz="2200" dirty="0" smtClean="0">
+                          <a:latin typeface="Consolas" panose="020B0609020204030204" pitchFamily="49" charset="0"/>
+                          <a:cs typeface="Consolas" panose="020B0609020204030204" pitchFamily="49" charset="0"/>
+                        </a:rPr>
+                        <a:t>8,860</a:t>
+                      </a:r>
+                      <a:endParaRPr lang="en-US" sz="2200" dirty="0">
+                        <a:latin typeface="Consolas" panose="020B0609020204030204" pitchFamily="49" charset="0"/>
+                        <a:cs typeface="Consolas" panose="020B0609020204030204" pitchFamily="49" charset="0"/>
+                      </a:endParaRPr>
+                    </a:p>
+                  </a:txBody>
+                  <a:tcPr/>
+                </a:tc>
+                <a:tc>
+                  <a:txBody>
+                    <a:bodyPr/>
+                    <a:lstStyle/>
+                    <a:p>
+                      <a:pPr algn="r"/>
+                      <a:r>
+                        <a:rPr lang="en-US" sz="2200" dirty="0" smtClean="0">
+                          <a:latin typeface="Consolas" panose="020B0609020204030204" pitchFamily="49" charset="0"/>
+                          <a:cs typeface="Consolas" panose="020B0609020204030204" pitchFamily="49" charset="0"/>
+                        </a:rPr>
+                        <a:t>0.20</a:t>
+                      </a:r>
+                      <a:endParaRPr lang="en-US" sz="2200" dirty="0">
+                        <a:latin typeface="Consolas" panose="020B0609020204030204" pitchFamily="49" charset="0"/>
+                        <a:cs typeface="Consolas" panose="020B0609020204030204" pitchFamily="49" charset="0"/>
+                      </a:endParaRPr>
+                    </a:p>
+                  </a:txBody>
+                  <a:tcPr/>
+                </a:tc>
+              </a:tr>
+              <a:tr h="579120">
+                <a:tc>
+                  <a:txBody>
+                    <a:bodyPr/>
+                    <a:lstStyle/>
+                    <a:p>
+                      <a:r>
+                        <a:rPr lang="en-US" sz="2200" dirty="0" smtClean="0">
+                          <a:latin typeface="Arial" panose="020B0604020202020204" pitchFamily="34" charset="0"/>
+                          <a:cs typeface="Arial" panose="020B0604020202020204" pitchFamily="34" charset="0"/>
+                        </a:rPr>
+                        <a:t>April</a:t>
+                      </a:r>
+                      <a:r>
+                        <a:rPr lang="en-US" sz="2200" baseline="0" dirty="0" smtClean="0">
+                          <a:latin typeface="Arial" panose="020B0604020202020204" pitchFamily="34" charset="0"/>
+                          <a:cs typeface="Arial" panose="020B0604020202020204" pitchFamily="34" charset="0"/>
+                        </a:rPr>
+                        <a:t> 2013</a:t>
+                      </a:r>
+                      <a:endParaRPr lang="en-US" sz="2200" dirty="0">
+                        <a:latin typeface="Arial" panose="020B0604020202020204" pitchFamily="34" charset="0"/>
+                        <a:cs typeface="Arial" panose="020B0604020202020204" pitchFamily="34" charset="0"/>
+                      </a:endParaRPr>
+                    </a:p>
+                  </a:txBody>
+                  <a:tcPr/>
+                </a:tc>
+                <a:tc>
+                  <a:txBody>
+                    <a:bodyPr/>
+                    <a:lstStyle/>
+                    <a:p>
+                      <a:r>
+                        <a:rPr lang="en-US" sz="2200" dirty="0" smtClean="0">
+                          <a:latin typeface="Arial" panose="020B0604020202020204" pitchFamily="34" charset="0"/>
+                          <a:cs typeface="Arial" panose="020B0604020202020204" pitchFamily="34" charset="0"/>
+                        </a:rPr>
+                        <a:t>NSI</a:t>
+                      </a:r>
+                      <a:endParaRPr lang="en-US" sz="2200" dirty="0">
+                        <a:latin typeface="Arial" panose="020B0604020202020204" pitchFamily="34" charset="0"/>
+                        <a:cs typeface="Arial" panose="020B0604020202020204" pitchFamily="34" charset="0"/>
+                      </a:endParaRPr>
+                    </a:p>
+                  </a:txBody>
+                  <a:tcPr/>
+                </a:tc>
+                <a:tc>
+                  <a:txBody>
+                    <a:bodyPr/>
+                    <a:lstStyle/>
+                    <a:p>
+                      <a:pPr algn="r"/>
+                      <a:r>
+                        <a:rPr lang="en-US" sz="2200" dirty="0" smtClean="0">
+                          <a:latin typeface="Consolas" panose="020B0609020204030204" pitchFamily="49" charset="0"/>
+                          <a:cs typeface="Consolas" panose="020B0609020204030204" pitchFamily="49" charset="0"/>
+                        </a:rPr>
+                        <a:t>537,247</a:t>
+                      </a:r>
+                      <a:endParaRPr lang="en-US" sz="2200" dirty="0">
+                        <a:latin typeface="Consolas" panose="020B0609020204030204" pitchFamily="49" charset="0"/>
+                        <a:cs typeface="Consolas" panose="020B0609020204030204" pitchFamily="49" charset="0"/>
+                      </a:endParaRPr>
+                    </a:p>
+                  </a:txBody>
+                  <a:tcPr/>
+                </a:tc>
+                <a:tc>
+                  <a:txBody>
+                    <a:bodyPr/>
+                    <a:lstStyle/>
+                    <a:p>
+                      <a:pPr algn="r"/>
+                      <a:r>
+                        <a:rPr lang="en-US" sz="2200" dirty="0" smtClean="0">
+                          <a:latin typeface="Consolas" panose="020B0609020204030204" pitchFamily="49" charset="0"/>
+                          <a:cs typeface="Consolas" panose="020B0609020204030204" pitchFamily="49" charset="0"/>
+                        </a:rPr>
+                        <a:t>547,339</a:t>
+                      </a:r>
+                      <a:endParaRPr lang="en-US" sz="2200" dirty="0">
+                        <a:latin typeface="Consolas" panose="020B0609020204030204" pitchFamily="49" charset="0"/>
+                        <a:cs typeface="Consolas" panose="020B0609020204030204" pitchFamily="49" charset="0"/>
+                      </a:endParaRPr>
+                    </a:p>
+                  </a:txBody>
+                  <a:tcPr/>
+                </a:tc>
+                <a:tc>
+                  <a:txBody>
+                    <a:bodyPr/>
+                    <a:lstStyle/>
+                    <a:p>
+                      <a:pPr algn="r"/>
+                      <a:r>
+                        <a:rPr lang="en-US" sz="2200" dirty="0" smtClean="0">
+                          <a:latin typeface="Consolas" panose="020B0609020204030204" pitchFamily="49" charset="0"/>
+                          <a:cs typeface="Consolas" panose="020B0609020204030204" pitchFamily="49" charset="0"/>
+                        </a:rPr>
+                        <a:t>1.02</a:t>
+                      </a:r>
+                      <a:endParaRPr lang="en-US" sz="2200" dirty="0">
+                        <a:latin typeface="Consolas" panose="020B0609020204030204" pitchFamily="49" charset="0"/>
+                        <a:cs typeface="Consolas" panose="020B0609020204030204" pitchFamily="49" charset="0"/>
+                      </a:endParaRPr>
+                    </a:p>
+                  </a:txBody>
+                  <a:tcPr/>
+                </a:tc>
+              </a:tr>
+              <a:tr h="579120">
+                <a:tc>
+                  <a:txBody>
+                    <a:bodyPr/>
+                    <a:lstStyle/>
+                    <a:p>
+                      <a:r>
+                        <a:rPr lang="en-US" sz="2200" dirty="0" smtClean="0">
+                          <a:latin typeface="Arial" panose="020B0604020202020204" pitchFamily="34" charset="0"/>
+                          <a:cs typeface="Arial" panose="020B0604020202020204" pitchFamily="34" charset="0"/>
+                        </a:rPr>
+                        <a:t>May 2013</a:t>
+                      </a:r>
+                      <a:endParaRPr lang="en-US" sz="2200" dirty="0">
+                        <a:latin typeface="Arial" panose="020B0604020202020204" pitchFamily="34" charset="0"/>
+                        <a:cs typeface="Arial" panose="020B0604020202020204" pitchFamily="34" charset="0"/>
+                      </a:endParaRPr>
+                    </a:p>
+                  </a:txBody>
+                  <a:tcPr/>
+                </a:tc>
+                <a:tc>
+                  <a:txBody>
+                    <a:bodyPr/>
+                    <a:lstStyle/>
+                    <a:p>
+                      <a:r>
+                        <a:rPr lang="en-US" sz="2200" dirty="0" smtClean="0">
+                          <a:latin typeface="Arial" panose="020B0604020202020204" pitchFamily="34" charset="0"/>
+                          <a:cs typeface="Arial" panose="020B0604020202020204" pitchFamily="34" charset="0"/>
+                        </a:rPr>
+                        <a:t>SI</a:t>
+                      </a:r>
+                      <a:endParaRPr lang="en-US" sz="2200" dirty="0">
+                        <a:latin typeface="Arial" panose="020B0604020202020204" pitchFamily="34" charset="0"/>
+                        <a:cs typeface="Arial" panose="020B0604020202020204" pitchFamily="34" charset="0"/>
+                      </a:endParaRPr>
+                    </a:p>
+                  </a:txBody>
+                  <a:tcPr/>
+                </a:tc>
+                <a:tc>
+                  <a:txBody>
+                    <a:bodyPr/>
+                    <a:lstStyle/>
+                    <a:p>
+                      <a:pPr algn="r"/>
+                      <a:r>
+                        <a:rPr lang="en-US" sz="2200" dirty="0" smtClean="0">
+                          <a:latin typeface="Consolas" panose="020B0609020204030204" pitchFamily="49" charset="0"/>
+                          <a:cs typeface="Consolas" panose="020B0609020204030204" pitchFamily="49" charset="0"/>
+                        </a:rPr>
+                        <a:t>45,413</a:t>
+                      </a:r>
+                      <a:endParaRPr lang="en-US" sz="2200" dirty="0">
+                        <a:latin typeface="Consolas" panose="020B0609020204030204" pitchFamily="49" charset="0"/>
+                        <a:cs typeface="Consolas" panose="020B0609020204030204" pitchFamily="49" charset="0"/>
+                      </a:endParaRPr>
+                    </a:p>
+                  </a:txBody>
+                  <a:tcPr/>
+                </a:tc>
+                <a:tc>
+                  <a:txBody>
+                    <a:bodyPr/>
+                    <a:lstStyle/>
+                    <a:p>
+                      <a:pPr algn="r"/>
+                      <a:r>
+                        <a:rPr lang="en-US" sz="2200" dirty="0" smtClean="0">
+                          <a:latin typeface="Consolas" panose="020B0609020204030204" pitchFamily="49" charset="0"/>
+                          <a:cs typeface="Consolas" panose="020B0609020204030204" pitchFamily="49" charset="0"/>
+                        </a:rPr>
+                        <a:t>9,332</a:t>
+                      </a:r>
+                      <a:endParaRPr lang="en-US" sz="2200" dirty="0">
+                        <a:latin typeface="Consolas" panose="020B0609020204030204" pitchFamily="49" charset="0"/>
+                        <a:cs typeface="Consolas" panose="020B0609020204030204" pitchFamily="49" charset="0"/>
+                      </a:endParaRPr>
+                    </a:p>
+                  </a:txBody>
+                  <a:tcPr/>
+                </a:tc>
+                <a:tc>
+                  <a:txBody>
+                    <a:bodyPr/>
+                    <a:lstStyle/>
+                    <a:p>
+                      <a:pPr algn="r"/>
+                      <a:r>
+                        <a:rPr lang="en-US" sz="2200" dirty="0" smtClean="0">
+                          <a:latin typeface="Consolas" panose="020B0609020204030204" pitchFamily="49" charset="0"/>
+                          <a:cs typeface="Consolas" panose="020B0609020204030204" pitchFamily="49" charset="0"/>
+                        </a:rPr>
+                        <a:t>0.21</a:t>
+                      </a:r>
+                      <a:endParaRPr lang="en-US" sz="2200" dirty="0">
+                        <a:latin typeface="Consolas" panose="020B0609020204030204" pitchFamily="49" charset="0"/>
+                        <a:cs typeface="Consolas" panose="020B0609020204030204" pitchFamily="49" charset="0"/>
+                      </a:endParaRPr>
+                    </a:p>
+                  </a:txBody>
+                  <a:tcPr/>
+                </a:tc>
+              </a:tr>
+              <a:tr h="579120">
+                <a:tc>
+                  <a:txBody>
+                    <a:bodyPr/>
+                    <a:lstStyle/>
+                    <a:p>
+                      <a:r>
+                        <a:rPr lang="en-US" sz="2200" dirty="0" smtClean="0">
+                          <a:latin typeface="Arial" panose="020B0604020202020204" pitchFamily="34" charset="0"/>
+                          <a:cs typeface="Arial" panose="020B0604020202020204" pitchFamily="34" charset="0"/>
+                        </a:rPr>
+                        <a:t>May 2013</a:t>
+                      </a:r>
+                      <a:endParaRPr lang="en-US" sz="2200" dirty="0">
+                        <a:latin typeface="Arial" panose="020B0604020202020204" pitchFamily="34" charset="0"/>
+                        <a:cs typeface="Arial" panose="020B0604020202020204" pitchFamily="34" charset="0"/>
+                      </a:endParaRPr>
+                    </a:p>
+                  </a:txBody>
+                  <a:tcPr/>
+                </a:tc>
+                <a:tc>
+                  <a:txBody>
+                    <a:bodyPr/>
+                    <a:lstStyle/>
+                    <a:p>
+                      <a:r>
+                        <a:rPr lang="en-US" sz="2200" dirty="0" smtClean="0">
+                          <a:latin typeface="Arial" panose="020B0604020202020204" pitchFamily="34" charset="0"/>
+                          <a:cs typeface="Arial" panose="020B0604020202020204" pitchFamily="34" charset="0"/>
+                        </a:rPr>
+                        <a:t>NSI</a:t>
+                      </a:r>
+                      <a:endParaRPr lang="en-US" sz="2200" dirty="0">
+                        <a:latin typeface="Arial" panose="020B0604020202020204" pitchFamily="34" charset="0"/>
+                        <a:cs typeface="Arial" panose="020B0604020202020204" pitchFamily="34" charset="0"/>
+                      </a:endParaRPr>
+                    </a:p>
+                  </a:txBody>
+                  <a:tcPr/>
+                </a:tc>
+                <a:tc>
+                  <a:txBody>
+                    <a:bodyPr/>
+                    <a:lstStyle/>
+                    <a:p>
+                      <a:pPr algn="r"/>
+                      <a:r>
+                        <a:rPr lang="en-US" sz="2200" dirty="0" smtClean="0">
+                          <a:latin typeface="Consolas" panose="020B0609020204030204" pitchFamily="49" charset="0"/>
+                          <a:cs typeface="Consolas" panose="020B0609020204030204" pitchFamily="49" charset="0"/>
+                        </a:rPr>
+                        <a:t>536,633</a:t>
+                      </a:r>
+                      <a:endParaRPr lang="en-US" sz="2200" dirty="0">
+                        <a:latin typeface="Consolas" panose="020B0609020204030204" pitchFamily="49" charset="0"/>
+                        <a:cs typeface="Consolas" panose="020B0609020204030204" pitchFamily="49" charset="0"/>
+                      </a:endParaRPr>
+                    </a:p>
+                  </a:txBody>
+                  <a:tcPr/>
+                </a:tc>
+                <a:tc>
+                  <a:txBody>
+                    <a:bodyPr/>
+                    <a:lstStyle/>
+                    <a:p>
+                      <a:pPr algn="r"/>
+                      <a:r>
+                        <a:rPr lang="en-US" sz="2200" dirty="0" smtClean="0">
+                          <a:latin typeface="Consolas" panose="020B0609020204030204" pitchFamily="49" charset="0"/>
+                          <a:cs typeface="Consolas" panose="020B0609020204030204" pitchFamily="49" charset="0"/>
+                        </a:rPr>
+                        <a:t>546,005</a:t>
+                      </a:r>
+                      <a:endParaRPr lang="en-US" sz="2200" dirty="0">
+                        <a:latin typeface="Consolas" panose="020B0609020204030204" pitchFamily="49" charset="0"/>
+                        <a:cs typeface="Consolas" panose="020B0609020204030204" pitchFamily="49" charset="0"/>
+                      </a:endParaRPr>
+                    </a:p>
+                  </a:txBody>
+                  <a:tcPr/>
+                </a:tc>
+                <a:tc>
+                  <a:txBody>
+                    <a:bodyPr/>
+                    <a:lstStyle/>
+                    <a:p>
+                      <a:pPr algn="r"/>
+                      <a:r>
+                        <a:rPr lang="en-US" sz="2200" dirty="0" smtClean="0">
+                          <a:latin typeface="Consolas" panose="020B0609020204030204" pitchFamily="49" charset="0"/>
+                          <a:cs typeface="Consolas" panose="020B0609020204030204" pitchFamily="49" charset="0"/>
+                        </a:rPr>
+                        <a:t>1.02</a:t>
+                      </a:r>
+                      <a:endParaRPr lang="en-US" sz="2200" dirty="0">
+                        <a:latin typeface="Consolas" panose="020B0609020204030204" pitchFamily="49" charset="0"/>
+                        <a:cs typeface="Consolas" panose="020B0609020204030204" pitchFamily="49" charset="0"/>
+                      </a:endParaRPr>
+                    </a:p>
+                  </a:txBody>
+                  <a:tcPr/>
+                </a:tc>
+              </a:tr>
+            </a:tbl>
+          </a:graphicData>
+        </a:graphic>
+      </p:graphicFrame>
+      <p:sp>
+        <p:nvSpPr>
+          <p:cNvPr id="58" name="Text Box 155"/>
+          <p:cNvSpPr txBox="1">
+            <a:spLocks noChangeArrowheads="1"/>
+          </p:cNvSpPr>
+          <p:nvPr/>
+        </p:nvSpPr>
+        <p:spPr bwMode="auto">
+          <a:xfrm>
+            <a:off x="9067800" y="15998063"/>
+            <a:ext cx="7624763" cy="1604137"/>
+          </a:xfrm>
+          <a:prstGeom prst="rect">
+            <a:avLst/>
+          </a:prstGeom>
+          <a:noFill/>
+          <a:ln>
+            <a:noFill/>
+          </a:ln>
+          <a:extLst>
+            <a:ext uri="{909E8E84-426E-40DD-AFC4-6F175D3DCCD1}">
+              <a14:hiddenFill xmlns:a14="http://schemas.microsoft.com/office/drawing/2010/main">
+                <a:solidFill>
+                  <a:srgbClr val="FFFFFF"/>
+                </a:solidFill>
+              </a14:hiddenFill>
+            </a:ext>
+            <a:ext uri="{91240B29-F687-4F45-9708-019B960494DF}">
+              <a14:hiddenLine xmlns:a14="http://schemas.microsoft.com/office/drawing/2010/main" w="9525">
+                <a:solidFill>
+                  <a:srgbClr val="000000"/>
+                </a:solidFill>
+                <a:miter lim="800000"/>
+                <a:headEnd/>
+                <a:tailEnd/>
+              </a14:hiddenLine>
+            </a:ext>
+          </a:extLst>
+        </p:spPr>
+        <p:txBody>
+          <a:bodyPr/>
+          <a:lstStyle>
+            <a:lvl1pPr marL="228600" indent="-228600" eaLnBrk="0" hangingPunct="0">
+              <a:defRPr sz="2000">
+                <a:solidFill>
+                  <a:schemeClr val="tx1"/>
+                </a:solidFill>
+                <a:latin typeface="Arial" charset="0"/>
+                <a:ea typeface="ＭＳ Ｐゴシック" pitchFamily="-112" charset="-128"/>
+              </a:defRPr>
+            </a:lvl1pPr>
+            <a:lvl2pPr marL="37931725" indent="-37474525" eaLnBrk="0" hangingPunct="0">
+              <a:defRPr sz="2000">
+                <a:solidFill>
+                  <a:schemeClr val="tx1"/>
+                </a:solidFill>
+                <a:latin typeface="Arial" charset="0"/>
+                <a:ea typeface="ＭＳ Ｐゴシック" pitchFamily="-112" charset="-128"/>
+              </a:defRPr>
+            </a:lvl2pPr>
+            <a:lvl3pPr eaLnBrk="0" hangingPunct="0">
+              <a:defRPr sz="2000">
+                <a:solidFill>
+                  <a:schemeClr val="tx1"/>
+                </a:solidFill>
+                <a:latin typeface="Arial" charset="0"/>
+                <a:ea typeface="ＭＳ Ｐゴシック" pitchFamily="-112" charset="-128"/>
+              </a:defRPr>
+            </a:lvl3pPr>
+            <a:lvl4pPr eaLnBrk="0" hangingPunct="0">
+              <a:defRPr sz="2000">
+                <a:solidFill>
+                  <a:schemeClr val="tx1"/>
+                </a:solidFill>
+                <a:latin typeface="Arial" charset="0"/>
+                <a:ea typeface="ＭＳ Ｐゴシック" pitchFamily="-112" charset="-128"/>
+              </a:defRPr>
+            </a:lvl4pPr>
+            <a:lvl5pPr eaLnBrk="0" hangingPunct="0">
+              <a:defRPr sz="2000">
+                <a:solidFill>
+                  <a:schemeClr val="tx1"/>
+                </a:solidFill>
+                <a:latin typeface="Arial" charset="0"/>
+                <a:ea typeface="ＭＳ Ｐゴシック" pitchFamily="-112" charset="-128"/>
+              </a:defRPr>
+            </a:lvl5pPr>
+            <a:lvl6pPr marL="457200" eaLnBrk="0" fontAlgn="base" hangingPunct="0">
+              <a:spcBef>
+                <a:spcPct val="0"/>
+              </a:spcBef>
+              <a:spcAft>
+                <a:spcPct val="0"/>
+              </a:spcAft>
+              <a:defRPr sz="2000">
+                <a:solidFill>
+                  <a:schemeClr val="tx1"/>
+                </a:solidFill>
+                <a:latin typeface="Arial" charset="0"/>
+                <a:ea typeface="ＭＳ Ｐゴシック" pitchFamily="-112" charset="-128"/>
+              </a:defRPr>
+            </a:lvl6pPr>
+            <a:lvl7pPr marL="914400" eaLnBrk="0" fontAlgn="base" hangingPunct="0">
+              <a:spcBef>
+                <a:spcPct val="0"/>
+              </a:spcBef>
+              <a:spcAft>
+                <a:spcPct val="0"/>
+              </a:spcAft>
+              <a:defRPr sz="2000">
+                <a:solidFill>
+                  <a:schemeClr val="tx1"/>
+                </a:solidFill>
+                <a:latin typeface="Arial" charset="0"/>
+                <a:ea typeface="ＭＳ Ｐゴシック" pitchFamily="-112" charset="-128"/>
+              </a:defRPr>
+            </a:lvl7pPr>
+            <a:lvl8pPr marL="1371600" eaLnBrk="0" fontAlgn="base" hangingPunct="0">
+              <a:spcBef>
+                <a:spcPct val="0"/>
+              </a:spcBef>
+              <a:spcAft>
+                <a:spcPct val="0"/>
+              </a:spcAft>
+              <a:defRPr sz="2000">
+                <a:solidFill>
+                  <a:schemeClr val="tx1"/>
+                </a:solidFill>
+                <a:latin typeface="Arial" charset="0"/>
+                <a:ea typeface="ＭＳ Ｐゴシック" pitchFamily="-112" charset="-128"/>
+              </a:defRPr>
+            </a:lvl8pPr>
+            <a:lvl9pPr marL="1828800" eaLnBrk="0" fontAlgn="base" hangingPunct="0">
+              <a:spcBef>
+                <a:spcPct val="0"/>
+              </a:spcBef>
+              <a:spcAft>
+                <a:spcPct val="0"/>
+              </a:spcAft>
+              <a:defRPr sz="2000">
+                <a:solidFill>
+                  <a:schemeClr val="tx1"/>
+                </a:solidFill>
+                <a:latin typeface="Arial" charset="0"/>
+                <a:ea typeface="ＭＳ Ｐゴシック" pitchFamily="-112" charset="-128"/>
+              </a:defRPr>
+            </a:lvl9pPr>
+          </a:lstStyle>
+          <a:p>
+            <a:pPr marL="457200" indent="-457200" eaLnBrk="1" hangingPunct="1">
+              <a:spcBef>
+                <a:spcPts val="0"/>
+              </a:spcBef>
+              <a:spcAft>
+                <a:spcPts val="1200"/>
+              </a:spcAft>
+              <a:buFont typeface="Arial" panose="020B0604020202020204" pitchFamily="34" charset="0"/>
+              <a:buChar char="•"/>
+            </a:pPr>
+            <a:r>
+              <a:rPr lang="en-US" altLang="en-US" sz="3200" b="1" dirty="0" smtClean="0">
+                <a:latin typeface="Tahoma" panose="020B0604030504040204" pitchFamily="34" charset="0"/>
+                <a:ea typeface="Tahoma" panose="020B0604030504040204" pitchFamily="34" charset="0"/>
+                <a:cs typeface="Tahoma" panose="020B0604030504040204" pitchFamily="34" charset="0"/>
+              </a:rPr>
+              <a:t>Plot</a:t>
+            </a:r>
+            <a:r>
+              <a:rPr lang="en-US" altLang="en-US" sz="3200" dirty="0" smtClean="0">
+                <a:latin typeface="Tahoma" panose="020B0604030504040204" pitchFamily="34" charset="0"/>
+                <a:ea typeface="Tahoma" panose="020B0604030504040204" pitchFamily="34" charset="0"/>
+                <a:cs typeface="Tahoma" panose="020B0604030504040204" pitchFamily="34" charset="0"/>
+              </a:rPr>
+              <a:t> rates over time by site.</a:t>
             </a:r>
           </a:p>
           <a:p>
-            <a:pPr marL="0" indent="0" eaLnBrk="1" hangingPunct="1">
+            <a:pPr marL="457200" indent="-457200" eaLnBrk="1" hangingPunct="1">
               <a:spcBef>
                 <a:spcPts val="0"/>
               </a:spcBef>
               <a:spcAft>
                 <a:spcPts val="1200"/>
               </a:spcAft>
+              <a:buFont typeface="Arial" panose="020B0604020202020204" pitchFamily="34" charset="0"/>
+              <a:buChar char="•"/>
             </a:pPr>
             <a:r>
-              <a:rPr lang="en-US" altLang="en-US" sz="2800" dirty="0" smtClean="0"/>
-              <a:t>We then produced by-site plots of these rates over time, to allow for quick evaluation and cross-site comparisons.</a:t>
+              <a:rPr lang="en-US" altLang="en-US" sz="3200" dirty="0" smtClean="0">
+                <a:latin typeface="Tahoma" panose="020B0604030504040204" pitchFamily="34" charset="0"/>
+                <a:ea typeface="Tahoma" panose="020B0604030504040204" pitchFamily="34" charset="0"/>
+                <a:cs typeface="Tahoma" panose="020B0604030504040204" pitchFamily="34" charset="0"/>
+              </a:rPr>
+              <a:t>Best implementations show </a:t>
             </a:r>
-            <a:endParaRPr lang="en-US" altLang="en-US" sz="2800" dirty="0"/>
-          </a:p>
-          <a:p>
-            <a:pPr marL="0" indent="0" eaLnBrk="1" hangingPunct="1">
-              <a:spcBef>
-                <a:spcPct val="5000"/>
-              </a:spcBef>
-              <a:spcAft>
-                <a:spcPts val="1200"/>
-              </a:spcAft>
-            </a:pPr>
             <a:r>
-              <a:rPr lang="en-US" altLang="en-US" sz="2800" dirty="0" smtClean="0"/>
-              <a:t>In general, we should expect to see higher rates of records for enrollees for whom the relevant flag is set to N than those with Y values.</a:t>
+              <a:rPr lang="en-US" altLang="en-US" sz="3200" b="1" dirty="0" smtClean="0">
+                <a:latin typeface="Tahoma" panose="020B0604030504040204" pitchFamily="34" charset="0"/>
+                <a:ea typeface="Tahoma" panose="020B0604030504040204" pitchFamily="34" charset="0"/>
+                <a:cs typeface="Tahoma" panose="020B0604030504040204" pitchFamily="34" charset="0"/>
+              </a:rPr>
+              <a:t>discernible differences</a:t>
             </a:r>
-          </a:p>
-          <a:p>
-            <a:pPr marL="0" indent="0" eaLnBrk="1" hangingPunct="1">
-              <a:spcBef>
-                <a:spcPct val="5000"/>
-              </a:spcBef>
-            </a:pPr>
             <a:r>
-              <a:rPr lang="en-US" altLang="en-US" sz="2800" dirty="0" smtClean="0"/>
-              <a:t>Non-implementing sites’ rates are illustrative for comparison.</a:t>
+              <a:rPr lang="en-US" altLang="en-US" sz="3200" dirty="0" smtClean="0">
+                <a:latin typeface="Tahoma" panose="020B0604030504040204" pitchFamily="34" charset="0"/>
+                <a:ea typeface="Tahoma" panose="020B0604030504040204" pitchFamily="34" charset="0"/>
+                <a:cs typeface="Tahoma" panose="020B0604030504040204" pitchFamily="34" charset="0"/>
+              </a:rPr>
+              <a:t> in rates.</a:t>
             </a:r>
-            <a:endParaRPr lang="en-US" altLang="en-US" sz="2800" dirty="0" smtClean="0"/>
+            <a:endParaRPr lang="en-US" altLang="en-US" sz="3200" dirty="0" smtClean="0">
+              <a:latin typeface="Tahoma" panose="020B0604030504040204" pitchFamily="34" charset="0"/>
+              <a:ea typeface="Tahoma" panose="020B0604030504040204" pitchFamily="34" charset="0"/>
+              <a:cs typeface="Tahoma" panose="020B0604030504040204" pitchFamily="34" charset="0"/>
+            </a:endParaRPr>
           </a:p>
         </p:txBody>
       </p:sp>
@@ -7305,9 +8478,9 @@
         <p:grpSpPr>
           <a:xfrm>
             <a:off x="609362" y="762000"/>
-            <a:ext cx="26687701" cy="2667238"/>
+            <a:ext cx="26687701" cy="2362200"/>
             <a:chOff x="914400" y="762000"/>
-            <a:chExt cx="26382663" cy="2667238"/>
+            <a:chExt cx="26382663" cy="2362200"/>
           </a:xfrm>
         </p:grpSpPr>
         <p:sp>
@@ -7633,11 +8806,6 @@
                 </a:rPr>
                 <a:t>: VDW Data Capture Revisited</a:t>
               </a:r>
-              <a:endParaRPr lang="en-US" altLang="en-US" sz="5800" dirty="0">
-                <a:solidFill>
-                  <a:schemeClr val="bg1"/>
-                </a:solidFill>
-              </a:endParaRPr>
             </a:p>
           </p:txBody>
         </p:sp>
@@ -7652,7 +8820,7 @@
           <p:spPr bwMode="auto">
             <a:xfrm>
               <a:off x="1392238" y="1828800"/>
-              <a:ext cx="25506362" cy="1600438"/>
+              <a:ext cx="25506362" cy="1277273"/>
             </a:xfrm>
             <a:prstGeom prst="rect">
               <a:avLst/>
@@ -7804,23 +8972,7 @@
                     <a:schemeClr val="bg1"/>
                   </a:solidFill>
                 </a:rPr>
-                <a:t>Roy </a:t>
-              </a:r>
-              <a:r>
-                <a:rPr lang="en-US" altLang="en-US" dirty="0" smtClean="0">
-                  <a:solidFill>
-                    <a:schemeClr val="bg1"/>
-                  </a:solidFill>
-                </a:rPr>
-                <a:t>Pardee, JD </a:t>
-              </a:r>
-              <a:r>
-                <a:rPr lang="en-US" altLang="en-US" dirty="0" smtClean="0">
-                  <a:solidFill>
-                    <a:schemeClr val="bg1"/>
-                  </a:solidFill>
-                </a:rPr>
-                <a:t>MA</a:t>
+                <a:t>Roy Pardee, JD MA</a:t>
               </a:r>
               <a:r>
                 <a:rPr lang="en-US" altLang="en-US" baseline="30000" dirty="0" smtClean="0">
@@ -8112,15 +9264,7 @@
                     <a:schemeClr val="bg1"/>
                   </a:solidFill>
                 </a:rPr>
-                <a:t>The Center for Health Research, Kaiser Permanente </a:t>
-              </a:r>
-              <a:r>
-                <a:rPr lang="en-US" altLang="en-US" sz="1600" dirty="0" smtClean="0">
-                  <a:solidFill>
-                    <a:schemeClr val="bg1"/>
-                  </a:solidFill>
-                </a:rPr>
-                <a:t>Northwest </a:t>
+                <a:t>The Center for Health Research, Kaiser Permanente Northwest </a:t>
               </a:r>
               <a:r>
                 <a:rPr lang="en-US" altLang="en-US" sz="1600" baseline="30000" dirty="0" smtClean="0">
@@ -8256,37 +9400,25 @@
                     <a:schemeClr val="bg1"/>
                   </a:solidFill>
                 </a:rPr>
-                <a:t>Marshfield Clinic Research Foundation</a:t>
+                <a:t>Marshfield Clinic </a:t>
+              </a:r>
+              <a:r>
+                <a:rPr lang="en-US" altLang="en-US" sz="1600">
+                  <a:solidFill>
+                    <a:schemeClr val="bg1"/>
+                  </a:solidFill>
+                </a:rPr>
+                <a:t>Research </a:t>
+              </a:r>
+              <a:r>
+                <a:rPr lang="en-US" altLang="en-US" sz="1600" smtClean="0">
+                  <a:solidFill>
+                    <a:schemeClr val="bg1"/>
+                  </a:solidFill>
+                </a:rPr>
+                <a:t>Foundation</a:t>
               </a:r>
               <a:endParaRPr lang="en-US" altLang="en-US" sz="1600" dirty="0" smtClean="0">
-                <a:solidFill>
-                  <a:schemeClr val="bg1"/>
-                </a:solidFill>
-              </a:endParaRPr>
-            </a:p>
-            <a:p>
-              <a:pPr>
-                <a:spcBef>
-                  <a:spcPts val="600"/>
-                </a:spcBef>
-              </a:pPr>
-              <a:r>
-                <a:rPr lang="en-US" altLang="en-US" sz="1600" dirty="0" smtClean="0">
-                  <a:solidFill>
-                    <a:schemeClr val="bg1"/>
-                  </a:solidFill>
-                </a:rPr>
-                <a:t>and </a:t>
-              </a:r>
-              <a:r>
-                <a:rPr lang="en-US" altLang="en-US" sz="1600" dirty="0">
-                  <a:solidFill>
-                    <a:schemeClr val="bg1"/>
-                  </a:solidFill>
-                </a:rPr>
-                <a:t>Research</a:t>
-              </a:r>
-              <a:endParaRPr lang="en-US" altLang="en-US" sz="4400" dirty="0">
                 <a:solidFill>
                   <a:schemeClr val="bg1"/>
                 </a:solidFill>
@@ -9099,15 +10231,7 @@
                   <a:schemeClr val="bg1"/>
                 </a:solidFill>
               </a:rPr>
-              <a:t>The New </a:t>
-            </a:r>
-            <a:r>
-              <a:rPr lang="en-US" altLang="en-US" sz="4400" dirty="0" smtClean="0">
-                <a:solidFill>
-                  <a:schemeClr val="bg1"/>
-                </a:solidFill>
-              </a:rPr>
-              <a:t>Variables</a:t>
+              <a:t>The New Variables</a:t>
             </a:r>
             <a:endParaRPr lang="en-US" altLang="en-US" sz="4400" dirty="0">
               <a:solidFill>
@@ -10812,15 +11936,7 @@
             </a:r>
             <a:r>
               <a:rPr lang="en-US" altLang="en-US" sz="2800" dirty="0" smtClean="0"/>
-              <a:t>—sites must have the fields in th</a:t>
-            </a:r>
-            <a:r>
-              <a:rPr lang="en-US" altLang="en-US" sz="2800" dirty="0" smtClean="0"/>
-              <a:t>e table</a:t>
-            </a:r>
-            <a:r>
-              <a:rPr lang="en-US" altLang="en-US" sz="2800" dirty="0" smtClean="0"/>
-              <a:t>, but can opt to use the ‘X’ value to signify no substantive implementation.</a:t>
+              <a:t>—sites must have the fields in the table, but can opt to use the ‘X’ value to signify no substantive implementation.</a:t>
             </a:r>
           </a:p>
           <a:p>
@@ -10833,11 +11949,7 @@
             </a:pPr>
             <a:r>
               <a:rPr lang="en-US" altLang="en-US" sz="2800" dirty="0" smtClean="0"/>
-              <a:t>In practical terms, w</a:t>
-            </a:r>
-            <a:r>
-              <a:rPr lang="en-US" altLang="en-US" sz="2800" dirty="0" smtClean="0"/>
-              <a:t>e recommend interpreting </a:t>
+              <a:t>In practical terms, we recommend interpreting </a:t>
             </a:r>
             <a:r>
               <a:rPr lang="en-US" altLang="en-US" sz="2800" dirty="0" err="1" smtClean="0"/>
@@ -10889,7 +12001,6 @@
               <a:rPr lang="en-US" altLang="en-US" sz="2800" dirty="0" smtClean="0"/>
               <a:t> of a reason why capture should be incomplete.</a:t>
             </a:r>
-            <a:endParaRPr lang="en-US" altLang="en-US" sz="2800" dirty="0" smtClean="0"/>
           </a:p>
         </p:txBody>
       </p:sp>
@@ -11732,11 +12843,7 @@
             </a:pPr>
             <a:r>
               <a:rPr lang="en-US" altLang="en-US" dirty="0" smtClean="0"/>
-              <a:t>Six sites have SI values on EMR data (here signified by social history data).  Implementations are all good post-2010. </a:t>
-            </a:r>
-            <a:r>
-              <a:rPr lang="en-US" altLang="en-US" dirty="0" smtClean="0"/>
-              <a:t>KPCO and KPNC are excellent overall.</a:t>
+              <a:t>Six sites have SI values on EMR data (here signified by social history data).  Implementations are all good post-2010. KPCO and KPNC are excellent overall.</a:t>
             </a:r>
             <a:endParaRPr lang="en-US" altLang="en-US" dirty="0"/>
           </a:p>
@@ -12645,19 +13752,7 @@
             </a:pPr>
             <a:r>
               <a:rPr lang="en-US" altLang="en-US" sz="2800" dirty="0" smtClean="0"/>
-              <a:t>After </a:t>
-            </a:r>
-            <a:r>
-              <a:rPr lang="en-US" altLang="en-US" sz="2800" dirty="0" smtClean="0"/>
-              <a:t>numerous HCSRN sites implemented </a:t>
-            </a:r>
-            <a:r>
-              <a:rPr lang="en-US" altLang="en-US" sz="2800" dirty="0" smtClean="0"/>
-              <a:t>these </a:t>
-            </a:r>
-            <a:r>
-              <a:rPr lang="en-US" altLang="en-US" sz="2800" dirty="0" smtClean="0"/>
-              <a:t>flags, the Enrollment workgroup put out an evaluation program which calculated </a:t>
+              <a:t>After numerous HCSRN sites implemented these flags, the Enrollment workgroup put out an evaluation program which calculated </a:t>
             </a:r>
             <a:r>
               <a:rPr lang="en-US" altLang="en-US" sz="2800" b="1" dirty="0" smtClean="0"/>
@@ -12715,7 +13810,6 @@
               <a:rPr lang="en-US" altLang="en-US" sz="2800" dirty="0" smtClean="0"/>
               <a:t>Non-implementing sites’ rates are illustrative for comparison.</a:t>
             </a:r>
-            <a:endParaRPr lang="en-US" altLang="en-US" sz="2800" dirty="0" smtClean="0"/>
           </a:p>
         </p:txBody>
       </p:sp>

</xml_diff>